<commit_message>
Encerramento do capítulo 7 - asserções; Início do capítulo 8 - threads.
</commit_message>
<xml_diff>
--- a/2-Java-Programmer-Modulo-II/13.Capitulo07.pptx
+++ b/2-Java-Programmer-Modulo-II/13.Capitulo07.pptx
@@ -5,16 +5,21 @@
     <p:sldMasterId id="2147483660" r:id="rId1"/>
   </p:sldMasterIdLst>
   <p:notesMasterIdLst>
-    <p:notesMasterId r:id="rId9"/>
+    <p:notesMasterId r:id="rId14"/>
   </p:notesMasterIdLst>
   <p:sldIdLst>
     <p:sldId id="256" r:id="rId2"/>
     <p:sldId id="304" r:id="rId3"/>
     <p:sldId id="298" r:id="rId4"/>
-    <p:sldId id="299" r:id="rId5"/>
-    <p:sldId id="300" r:id="rId6"/>
-    <p:sldId id="301" r:id="rId7"/>
-    <p:sldId id="303" r:id="rId8"/>
+    <p:sldId id="305" r:id="rId5"/>
+    <p:sldId id="299" r:id="rId6"/>
+    <p:sldId id="306" r:id="rId7"/>
+    <p:sldId id="300" r:id="rId8"/>
+    <p:sldId id="301" r:id="rId9"/>
+    <p:sldId id="307" r:id="rId10"/>
+    <p:sldId id="308" r:id="rId11"/>
+    <p:sldId id="309" r:id="rId12"/>
+    <p:sldId id="310" r:id="rId13"/>
   </p:sldIdLst>
   <p:sldSz cx="9144000" cy="6858000" type="screen4x3"/>
   <p:notesSz cx="6858000" cy="9144000"/>
@@ -255,7 +260,7 @@
               <a:pPr>
                 <a:defRPr/>
               </a:pPr>
-              <a:t>08/04/2012</a:t>
+              <a:t>09/04/2012</a:t>
             </a:fld>
             <a:endParaRPr lang="pt-BR"/>
           </a:p>
@@ -705,6 +710,295 @@
 </p:notes>
 </file>
 
+<file path=ppt/notesSlides/notesSlide10.xml><?xml version="1.0" encoding="utf-8"?>
+<p:notes xmlns:a="http://schemas.openxmlformats.org/drawingml/2006/main" xmlns:r="http://schemas.openxmlformats.org/officeDocument/2006/relationships" xmlns:p="http://schemas.openxmlformats.org/presentationml/2006/main">
+  <p:cSld>
+    <p:spTree>
+      <p:nvGrpSpPr>
+        <p:cNvPr id="1" name=""/>
+        <p:cNvGrpSpPr/>
+        <p:nvPr/>
+      </p:nvGrpSpPr>
+      <p:grpSpPr>
+        <a:xfrm>
+          <a:off x="0" y="0"/>
+          <a:ext cx="0" cy="0"/>
+          <a:chOff x="0" y="0"/>
+          <a:chExt cx="0" cy="0"/>
+        </a:xfrm>
+      </p:grpSpPr>
+      <p:sp>
+        <p:nvSpPr>
+          <p:cNvPr id="21506" name="Espaço Reservado para Imagem de Slide 1"/>
+          <p:cNvSpPr>
+            <a:spLocks noGrp="1" noRot="1" noChangeAspect="1" noTextEdit="1"/>
+          </p:cNvSpPr>
+          <p:nvPr>
+            <p:ph type="sldImg"/>
+          </p:nvPr>
+        </p:nvSpPr>
+        <p:spPr bwMode="auto">
+          <a:noFill/>
+          <a:ln>
+            <a:solidFill>
+              <a:srgbClr val="000000"/>
+            </a:solidFill>
+            <a:miter lim="800000"/>
+            <a:headEnd/>
+            <a:tailEnd/>
+          </a:ln>
+        </p:spPr>
+      </p:sp>
+      <p:sp>
+        <p:nvSpPr>
+          <p:cNvPr id="21507" name="Espaço Reservado para Anotações 2"/>
+          <p:cNvSpPr>
+            <a:spLocks noGrp="1"/>
+          </p:cNvSpPr>
+          <p:nvPr>
+            <p:ph type="body" idx="1"/>
+          </p:nvPr>
+        </p:nvSpPr>
+        <p:spPr bwMode="auto">
+          <a:noFill/>
+        </p:spPr>
+        <p:txBody>
+          <a:bodyPr wrap="square" numCol="1" anchor="t" anchorCtr="0" compatLnSpc="1">
+            <a:prstTxWarp prst="textNoShape">
+              <a:avLst/>
+            </a:prstTxWarp>
+          </a:bodyPr>
+          <a:lstStyle/>
+          <a:p>
+            <a:endParaRPr lang="pt-BR" smtClean="0"/>
+          </a:p>
+        </p:txBody>
+      </p:sp>
+      <p:sp>
+        <p:nvSpPr>
+          <p:cNvPr id="4" name="Espaço Reservado para Número de Slide 3"/>
+          <p:cNvSpPr>
+            <a:spLocks noGrp="1"/>
+          </p:cNvSpPr>
+          <p:nvPr>
+            <p:ph type="sldNum" sz="quarter" idx="5"/>
+          </p:nvPr>
+        </p:nvSpPr>
+        <p:spPr/>
+        <p:txBody>
+          <a:bodyPr/>
+          <a:lstStyle/>
+          <a:p>
+            <a:pPr>
+              <a:defRPr/>
+            </a:pPr>
+            <a:fld id="{F9021EB2-B595-4F6A-936A-3DF9152E5007}" type="slidenum">
+              <a:rPr lang="pt-BR" smtClean="0"/>
+              <a:pPr>
+                <a:defRPr/>
+              </a:pPr>
+              <a:t>10</a:t>
+            </a:fld>
+            <a:endParaRPr lang="pt-BR"/>
+          </a:p>
+        </p:txBody>
+      </p:sp>
+    </p:spTree>
+  </p:cSld>
+  <p:clrMapOvr>
+    <a:masterClrMapping/>
+  </p:clrMapOvr>
+</p:notes>
+</file>
+
+<file path=ppt/notesSlides/notesSlide11.xml><?xml version="1.0" encoding="utf-8"?>
+<p:notes xmlns:a="http://schemas.openxmlformats.org/drawingml/2006/main" xmlns:r="http://schemas.openxmlformats.org/officeDocument/2006/relationships" xmlns:p="http://schemas.openxmlformats.org/presentationml/2006/main">
+  <p:cSld>
+    <p:spTree>
+      <p:nvGrpSpPr>
+        <p:cNvPr id="1" name=""/>
+        <p:cNvGrpSpPr/>
+        <p:nvPr/>
+      </p:nvGrpSpPr>
+      <p:grpSpPr>
+        <a:xfrm>
+          <a:off x="0" y="0"/>
+          <a:ext cx="0" cy="0"/>
+          <a:chOff x="0" y="0"/>
+          <a:chExt cx="0" cy="0"/>
+        </a:xfrm>
+      </p:grpSpPr>
+      <p:sp>
+        <p:nvSpPr>
+          <p:cNvPr id="21506" name="Espaço Reservado para Imagem de Slide 1"/>
+          <p:cNvSpPr>
+            <a:spLocks noGrp="1" noRot="1" noChangeAspect="1" noTextEdit="1"/>
+          </p:cNvSpPr>
+          <p:nvPr>
+            <p:ph type="sldImg"/>
+          </p:nvPr>
+        </p:nvSpPr>
+        <p:spPr bwMode="auto">
+          <a:noFill/>
+          <a:ln>
+            <a:solidFill>
+              <a:srgbClr val="000000"/>
+            </a:solidFill>
+            <a:miter lim="800000"/>
+            <a:headEnd/>
+            <a:tailEnd/>
+          </a:ln>
+        </p:spPr>
+      </p:sp>
+      <p:sp>
+        <p:nvSpPr>
+          <p:cNvPr id="21507" name="Espaço Reservado para Anotações 2"/>
+          <p:cNvSpPr>
+            <a:spLocks noGrp="1"/>
+          </p:cNvSpPr>
+          <p:nvPr>
+            <p:ph type="body" idx="1"/>
+          </p:nvPr>
+        </p:nvSpPr>
+        <p:spPr bwMode="auto">
+          <a:noFill/>
+        </p:spPr>
+        <p:txBody>
+          <a:bodyPr wrap="square" numCol="1" anchor="t" anchorCtr="0" compatLnSpc="1">
+            <a:prstTxWarp prst="textNoShape">
+              <a:avLst/>
+            </a:prstTxWarp>
+          </a:bodyPr>
+          <a:lstStyle/>
+          <a:p>
+            <a:endParaRPr lang="pt-BR" smtClean="0"/>
+          </a:p>
+        </p:txBody>
+      </p:sp>
+      <p:sp>
+        <p:nvSpPr>
+          <p:cNvPr id="4" name="Espaço Reservado para Número de Slide 3"/>
+          <p:cNvSpPr>
+            <a:spLocks noGrp="1"/>
+          </p:cNvSpPr>
+          <p:nvPr>
+            <p:ph type="sldNum" sz="quarter" idx="5"/>
+          </p:nvPr>
+        </p:nvSpPr>
+        <p:spPr/>
+        <p:txBody>
+          <a:bodyPr/>
+          <a:lstStyle/>
+          <a:p>
+            <a:pPr>
+              <a:defRPr/>
+            </a:pPr>
+            <a:fld id="{F9021EB2-B595-4F6A-936A-3DF9152E5007}" type="slidenum">
+              <a:rPr lang="pt-BR" smtClean="0"/>
+              <a:pPr>
+                <a:defRPr/>
+              </a:pPr>
+              <a:t>11</a:t>
+            </a:fld>
+            <a:endParaRPr lang="pt-BR"/>
+          </a:p>
+        </p:txBody>
+      </p:sp>
+    </p:spTree>
+  </p:cSld>
+  <p:clrMapOvr>
+    <a:masterClrMapping/>
+  </p:clrMapOvr>
+</p:notes>
+</file>
+
+<file path=ppt/notesSlides/notesSlide12.xml><?xml version="1.0" encoding="utf-8"?>
+<p:notes xmlns:a="http://schemas.openxmlformats.org/drawingml/2006/main" xmlns:r="http://schemas.openxmlformats.org/officeDocument/2006/relationships" xmlns:p="http://schemas.openxmlformats.org/presentationml/2006/main">
+  <p:cSld>
+    <p:spTree>
+      <p:nvGrpSpPr>
+        <p:cNvPr id="1" name=""/>
+        <p:cNvGrpSpPr/>
+        <p:nvPr/>
+      </p:nvGrpSpPr>
+      <p:grpSpPr>
+        <a:xfrm>
+          <a:off x="0" y="0"/>
+          <a:ext cx="0" cy="0"/>
+          <a:chOff x="0" y="0"/>
+          <a:chExt cx="0" cy="0"/>
+        </a:xfrm>
+      </p:grpSpPr>
+      <p:sp>
+        <p:nvSpPr>
+          <p:cNvPr id="2" name="Espaço Reservado para Imagem de Slide 1"/>
+          <p:cNvSpPr>
+            <a:spLocks noGrp="1" noRot="1" noChangeAspect="1"/>
+          </p:cNvSpPr>
+          <p:nvPr>
+            <p:ph type="sldImg"/>
+          </p:nvPr>
+        </p:nvSpPr>
+        <p:spPr/>
+      </p:sp>
+      <p:sp>
+        <p:nvSpPr>
+          <p:cNvPr id="3" name="Espaço Reservado para Anotações 2"/>
+          <p:cNvSpPr>
+            <a:spLocks noGrp="1"/>
+          </p:cNvSpPr>
+          <p:nvPr>
+            <p:ph type="body" idx="1"/>
+          </p:nvPr>
+        </p:nvSpPr>
+        <p:spPr/>
+        <p:txBody>
+          <a:bodyPr>
+            <a:normAutofit/>
+          </a:bodyPr>
+          <a:lstStyle/>
+          <a:p>
+            <a:endParaRPr lang="pt-BR"/>
+          </a:p>
+        </p:txBody>
+      </p:sp>
+      <p:sp>
+        <p:nvSpPr>
+          <p:cNvPr id="4" name="Espaço Reservado para Número de Slide 3"/>
+          <p:cNvSpPr>
+            <a:spLocks noGrp="1"/>
+          </p:cNvSpPr>
+          <p:nvPr>
+            <p:ph type="sldNum" sz="quarter" idx="10"/>
+          </p:nvPr>
+        </p:nvSpPr>
+        <p:spPr/>
+        <p:txBody>
+          <a:bodyPr/>
+          <a:lstStyle/>
+          <a:p>
+            <a:pPr>
+              <a:defRPr/>
+            </a:pPr>
+            <a:fld id="{228DBC7E-C6B4-4221-AB24-099AF5F901C0}" type="slidenum">
+              <a:rPr lang="pt-BR" smtClean="0"/>
+              <a:pPr>
+                <a:defRPr/>
+              </a:pPr>
+              <a:t>12</a:t>
+            </a:fld>
+            <a:endParaRPr lang="pt-BR"/>
+          </a:p>
+        </p:txBody>
+      </p:sp>
+    </p:spTree>
+  </p:cSld>
+  <p:clrMapOvr>
+    <a:masterClrMapping/>
+  </p:clrMapOvr>
+</p:notes>
+</file>
+
 <file path=ppt/notesSlides/notesSlide2.xml><?xml version="1.0" encoding="utf-8"?>
 <p:notes xmlns:a="http://schemas.openxmlformats.org/drawingml/2006/main" xmlns:r="http://schemas.openxmlformats.org/officeDocument/2006/relationships" xmlns:p="http://schemas.openxmlformats.org/presentationml/2006/main">
   <p:cSld>
@@ -912,7 +1206,7 @@
       </p:grpSpPr>
       <p:sp>
         <p:nvSpPr>
-          <p:cNvPr id="19458" name="Espaço Reservado para Imagem de Slide 1"/>
+          <p:cNvPr id="18434" name="Espaço Reservado para Imagem de Slide 1"/>
           <p:cNvSpPr>
             <a:spLocks noGrp="1" noRot="1" noChangeAspect="1" noTextEdit="1"/>
           </p:cNvSpPr>
@@ -934,7 +1228,7 @@
       </p:sp>
       <p:sp>
         <p:nvSpPr>
-          <p:cNvPr id="19459" name="Espaço Reservado para Anotações 2"/>
+          <p:cNvPr id="18435" name="Espaço Reservado para Anotações 2"/>
           <p:cNvSpPr>
             <a:spLocks noGrp="1"/>
           </p:cNvSpPr>
@@ -975,7 +1269,7 @@
             <a:pPr>
               <a:defRPr/>
             </a:pPr>
-            <a:fld id="{31AF17AB-4831-4342-B2F5-6ECC058F8203}" type="slidenum">
+            <a:fld id="{4E6F0BBA-0E23-4A58-B800-09ABFE6EFE5D}" type="slidenum">
               <a:rPr lang="pt-BR" smtClean="0"/>
               <a:pPr>
                 <a:defRPr/>
@@ -1013,7 +1307,7 @@
       </p:grpSpPr>
       <p:sp>
         <p:nvSpPr>
-          <p:cNvPr id="20482" name="Espaço Reservado para Imagem de Slide 1"/>
+          <p:cNvPr id="19458" name="Espaço Reservado para Imagem de Slide 1"/>
           <p:cNvSpPr>
             <a:spLocks noGrp="1" noRot="1" noChangeAspect="1" noTextEdit="1"/>
           </p:cNvSpPr>
@@ -1035,7 +1329,7 @@
       </p:sp>
       <p:sp>
         <p:nvSpPr>
-          <p:cNvPr id="20483" name="Espaço Reservado para Anotações 2"/>
+          <p:cNvPr id="19459" name="Espaço Reservado para Anotações 2"/>
           <p:cNvSpPr>
             <a:spLocks noGrp="1"/>
           </p:cNvSpPr>
@@ -1076,7 +1370,7 @@
             <a:pPr>
               <a:defRPr/>
             </a:pPr>
-            <a:fld id="{B590D282-B9F4-4590-8829-44E1533AE7F2}" type="slidenum">
+            <a:fld id="{31AF17AB-4831-4342-B2F5-6ECC058F8203}" type="slidenum">
               <a:rPr lang="pt-BR" smtClean="0"/>
               <a:pPr>
                 <a:defRPr/>
@@ -1114,7 +1408,7 @@
       </p:grpSpPr>
       <p:sp>
         <p:nvSpPr>
-          <p:cNvPr id="21506" name="Espaço Reservado para Imagem de Slide 1"/>
+          <p:cNvPr id="19458" name="Espaço Reservado para Imagem de Slide 1"/>
           <p:cNvSpPr>
             <a:spLocks noGrp="1" noRot="1" noChangeAspect="1" noTextEdit="1"/>
           </p:cNvSpPr>
@@ -1136,7 +1430,7 @@
       </p:sp>
       <p:sp>
         <p:nvSpPr>
-          <p:cNvPr id="21507" name="Espaço Reservado para Anotações 2"/>
+          <p:cNvPr id="19459" name="Espaço Reservado para Anotações 2"/>
           <p:cNvSpPr>
             <a:spLocks noGrp="1"/>
           </p:cNvSpPr>
@@ -1177,7 +1471,7 @@
             <a:pPr>
               <a:defRPr/>
             </a:pPr>
-            <a:fld id="{F9021EB2-B595-4F6A-936A-3DF9152E5007}" type="slidenum">
+            <a:fld id="{31AF17AB-4831-4342-B2F5-6ECC058F8203}" type="slidenum">
               <a:rPr lang="pt-BR" smtClean="0"/>
               <a:pPr>
                 <a:defRPr/>
@@ -1215,7 +1509,7 @@
       </p:grpSpPr>
       <p:sp>
         <p:nvSpPr>
-          <p:cNvPr id="23554" name="Espaço Reservado para Imagem de Slide 1"/>
+          <p:cNvPr id="20482" name="Espaço Reservado para Imagem de Slide 1"/>
           <p:cNvSpPr>
             <a:spLocks noGrp="1" noRot="1" noChangeAspect="1" noTextEdit="1"/>
           </p:cNvSpPr>
@@ -1237,7 +1531,7 @@
       </p:sp>
       <p:sp>
         <p:nvSpPr>
-          <p:cNvPr id="23555" name="Espaço Reservado para Anotações 2"/>
+          <p:cNvPr id="20483" name="Espaço Reservado para Anotações 2"/>
           <p:cNvSpPr>
             <a:spLocks noGrp="1"/>
           </p:cNvSpPr>
@@ -1278,12 +1572,214 @@
             <a:pPr>
               <a:defRPr/>
             </a:pPr>
-            <a:fld id="{AEAE9572-64E5-4F15-AA25-D5CD3EB631BE}" type="slidenum">
+            <a:fld id="{B590D282-B9F4-4590-8829-44E1533AE7F2}" type="slidenum">
               <a:rPr lang="pt-BR" smtClean="0"/>
               <a:pPr>
                 <a:defRPr/>
               </a:pPr>
               <a:t>7</a:t>
+            </a:fld>
+            <a:endParaRPr lang="pt-BR"/>
+          </a:p>
+        </p:txBody>
+      </p:sp>
+    </p:spTree>
+  </p:cSld>
+  <p:clrMapOvr>
+    <a:masterClrMapping/>
+  </p:clrMapOvr>
+</p:notes>
+</file>
+
+<file path=ppt/notesSlides/notesSlide8.xml><?xml version="1.0" encoding="utf-8"?>
+<p:notes xmlns:a="http://schemas.openxmlformats.org/drawingml/2006/main" xmlns:r="http://schemas.openxmlformats.org/officeDocument/2006/relationships" xmlns:p="http://schemas.openxmlformats.org/presentationml/2006/main">
+  <p:cSld>
+    <p:spTree>
+      <p:nvGrpSpPr>
+        <p:cNvPr id="1" name=""/>
+        <p:cNvGrpSpPr/>
+        <p:nvPr/>
+      </p:nvGrpSpPr>
+      <p:grpSpPr>
+        <a:xfrm>
+          <a:off x="0" y="0"/>
+          <a:ext cx="0" cy="0"/>
+          <a:chOff x="0" y="0"/>
+          <a:chExt cx="0" cy="0"/>
+        </a:xfrm>
+      </p:grpSpPr>
+      <p:sp>
+        <p:nvSpPr>
+          <p:cNvPr id="21506" name="Espaço Reservado para Imagem de Slide 1"/>
+          <p:cNvSpPr>
+            <a:spLocks noGrp="1" noRot="1" noChangeAspect="1" noTextEdit="1"/>
+          </p:cNvSpPr>
+          <p:nvPr>
+            <p:ph type="sldImg"/>
+          </p:nvPr>
+        </p:nvSpPr>
+        <p:spPr bwMode="auto">
+          <a:noFill/>
+          <a:ln>
+            <a:solidFill>
+              <a:srgbClr val="000000"/>
+            </a:solidFill>
+            <a:miter lim="800000"/>
+            <a:headEnd/>
+            <a:tailEnd/>
+          </a:ln>
+        </p:spPr>
+      </p:sp>
+      <p:sp>
+        <p:nvSpPr>
+          <p:cNvPr id="21507" name="Espaço Reservado para Anotações 2"/>
+          <p:cNvSpPr>
+            <a:spLocks noGrp="1"/>
+          </p:cNvSpPr>
+          <p:nvPr>
+            <p:ph type="body" idx="1"/>
+          </p:nvPr>
+        </p:nvSpPr>
+        <p:spPr bwMode="auto">
+          <a:noFill/>
+        </p:spPr>
+        <p:txBody>
+          <a:bodyPr wrap="square" numCol="1" anchor="t" anchorCtr="0" compatLnSpc="1">
+            <a:prstTxWarp prst="textNoShape">
+              <a:avLst/>
+            </a:prstTxWarp>
+          </a:bodyPr>
+          <a:lstStyle/>
+          <a:p>
+            <a:endParaRPr lang="pt-BR" smtClean="0"/>
+          </a:p>
+        </p:txBody>
+      </p:sp>
+      <p:sp>
+        <p:nvSpPr>
+          <p:cNvPr id="4" name="Espaço Reservado para Número de Slide 3"/>
+          <p:cNvSpPr>
+            <a:spLocks noGrp="1"/>
+          </p:cNvSpPr>
+          <p:nvPr>
+            <p:ph type="sldNum" sz="quarter" idx="5"/>
+          </p:nvPr>
+        </p:nvSpPr>
+        <p:spPr/>
+        <p:txBody>
+          <a:bodyPr/>
+          <a:lstStyle/>
+          <a:p>
+            <a:pPr>
+              <a:defRPr/>
+            </a:pPr>
+            <a:fld id="{F9021EB2-B595-4F6A-936A-3DF9152E5007}" type="slidenum">
+              <a:rPr lang="pt-BR" smtClean="0"/>
+              <a:pPr>
+                <a:defRPr/>
+              </a:pPr>
+              <a:t>8</a:t>
+            </a:fld>
+            <a:endParaRPr lang="pt-BR"/>
+          </a:p>
+        </p:txBody>
+      </p:sp>
+    </p:spTree>
+  </p:cSld>
+  <p:clrMapOvr>
+    <a:masterClrMapping/>
+  </p:clrMapOvr>
+</p:notes>
+</file>
+
+<file path=ppt/notesSlides/notesSlide9.xml><?xml version="1.0" encoding="utf-8"?>
+<p:notes xmlns:a="http://schemas.openxmlformats.org/drawingml/2006/main" xmlns:r="http://schemas.openxmlformats.org/officeDocument/2006/relationships" xmlns:p="http://schemas.openxmlformats.org/presentationml/2006/main">
+  <p:cSld>
+    <p:spTree>
+      <p:nvGrpSpPr>
+        <p:cNvPr id="1" name=""/>
+        <p:cNvGrpSpPr/>
+        <p:nvPr/>
+      </p:nvGrpSpPr>
+      <p:grpSpPr>
+        <a:xfrm>
+          <a:off x="0" y="0"/>
+          <a:ext cx="0" cy="0"/>
+          <a:chOff x="0" y="0"/>
+          <a:chExt cx="0" cy="0"/>
+        </a:xfrm>
+      </p:grpSpPr>
+      <p:sp>
+        <p:nvSpPr>
+          <p:cNvPr id="21506" name="Espaço Reservado para Imagem de Slide 1"/>
+          <p:cNvSpPr>
+            <a:spLocks noGrp="1" noRot="1" noChangeAspect="1" noTextEdit="1"/>
+          </p:cNvSpPr>
+          <p:nvPr>
+            <p:ph type="sldImg"/>
+          </p:nvPr>
+        </p:nvSpPr>
+        <p:spPr bwMode="auto">
+          <a:noFill/>
+          <a:ln>
+            <a:solidFill>
+              <a:srgbClr val="000000"/>
+            </a:solidFill>
+            <a:miter lim="800000"/>
+            <a:headEnd/>
+            <a:tailEnd/>
+          </a:ln>
+        </p:spPr>
+      </p:sp>
+      <p:sp>
+        <p:nvSpPr>
+          <p:cNvPr id="21507" name="Espaço Reservado para Anotações 2"/>
+          <p:cNvSpPr>
+            <a:spLocks noGrp="1"/>
+          </p:cNvSpPr>
+          <p:nvPr>
+            <p:ph type="body" idx="1"/>
+          </p:nvPr>
+        </p:nvSpPr>
+        <p:spPr bwMode="auto">
+          <a:noFill/>
+        </p:spPr>
+        <p:txBody>
+          <a:bodyPr wrap="square" numCol="1" anchor="t" anchorCtr="0" compatLnSpc="1">
+            <a:prstTxWarp prst="textNoShape">
+              <a:avLst/>
+            </a:prstTxWarp>
+          </a:bodyPr>
+          <a:lstStyle/>
+          <a:p>
+            <a:endParaRPr lang="pt-BR" smtClean="0"/>
+          </a:p>
+        </p:txBody>
+      </p:sp>
+      <p:sp>
+        <p:nvSpPr>
+          <p:cNvPr id="4" name="Espaço Reservado para Número de Slide 3"/>
+          <p:cNvSpPr>
+            <a:spLocks noGrp="1"/>
+          </p:cNvSpPr>
+          <p:nvPr>
+            <p:ph type="sldNum" sz="quarter" idx="5"/>
+          </p:nvPr>
+        </p:nvSpPr>
+        <p:spPr/>
+        <p:txBody>
+          <a:bodyPr/>
+          <a:lstStyle/>
+          <a:p>
+            <a:pPr>
+              <a:defRPr/>
+            </a:pPr>
+            <a:fld id="{F9021EB2-B595-4F6A-936A-3DF9152E5007}" type="slidenum">
+              <a:rPr lang="pt-BR" smtClean="0"/>
+              <a:pPr>
+                <a:defRPr/>
+              </a:pPr>
+              <a:t>9</a:t>
             </a:fld>
             <a:endParaRPr lang="pt-BR"/>
           </a:p>
@@ -1710,12 +2206,9 @@
             <a:pPr>
               <a:defRPr/>
             </a:pPr>
-            <a:fld id="{9C4B112C-EC12-4603-B748-94304F35A469}" type="datetimeFigureOut">
-              <a:rPr lang="pt-BR"/>
-              <a:pPr>
-                <a:defRPr/>
-              </a:pPr>
-              <a:t>08/04/2012</a:t>
+            <a:fld id="{EBA5A136-789A-422F-94BD-5A2351D88EE1}" type="datetime1">
+              <a:rPr lang="pt-BR" smtClean="0"/>
+              <a:t>09/04/2012</a:t>
             </a:fld>
             <a:endParaRPr lang="pt-BR"/>
           </a:p>
@@ -1902,12 +2395,9 @@
             <a:pPr>
               <a:defRPr/>
             </a:pPr>
-            <a:fld id="{4348D974-F77E-4917-8A2E-0901DE6FF6D9}" type="datetimeFigureOut">
-              <a:rPr lang="pt-BR"/>
-              <a:pPr>
-                <a:defRPr/>
-              </a:pPr>
-              <a:t>08/04/2012</a:t>
+            <a:fld id="{6AED0C9D-5E33-445D-AD37-B05042AD6421}" type="datetime1">
+              <a:rPr lang="pt-BR" smtClean="0"/>
+              <a:t>09/04/2012</a:t>
             </a:fld>
             <a:endParaRPr lang="pt-BR"/>
           </a:p>
@@ -2104,12 +2594,9 @@
             <a:pPr>
               <a:defRPr/>
             </a:pPr>
-            <a:fld id="{E5358DA2-29A1-48FF-98B9-5C5EDBC090C4}" type="datetimeFigureOut">
-              <a:rPr lang="pt-BR"/>
-              <a:pPr>
-                <a:defRPr/>
-              </a:pPr>
-              <a:t>08/04/2012</a:t>
+            <a:fld id="{0E52AC94-EDEA-4653-87ED-BC1AA208D812}" type="datetime1">
+              <a:rPr lang="pt-BR" smtClean="0"/>
+              <a:t>09/04/2012</a:t>
             </a:fld>
             <a:endParaRPr lang="pt-BR"/>
           </a:p>
@@ -2300,12 +2787,9 @@
             <a:pPr>
               <a:defRPr/>
             </a:pPr>
-            <a:fld id="{047A9048-D469-4C86-BDAB-9FBA09993F7A}" type="datetimeFigureOut">
-              <a:rPr lang="pt-BR"/>
-              <a:pPr>
-                <a:defRPr/>
-              </a:pPr>
-              <a:t>08/04/2012</a:t>
+            <a:fld id="{0652EA2B-4DF6-45F9-AF21-90216B93F6E6}" type="datetime1">
+              <a:rPr lang="pt-BR" smtClean="0"/>
+              <a:t>09/04/2012</a:t>
             </a:fld>
             <a:endParaRPr lang="pt-BR"/>
           </a:p>
@@ -2806,12 +3290,9 @@
             <a:pPr>
               <a:defRPr/>
             </a:pPr>
-            <a:fld id="{A45B26C9-399B-44A0-A2DF-BB99F4EAFBF8}" type="datetimeFigureOut">
-              <a:rPr lang="pt-BR"/>
-              <a:pPr>
-                <a:defRPr/>
-              </a:pPr>
-              <a:t>08/04/2012</a:t>
+            <a:fld id="{28FDB8EC-C2F4-48EA-86E3-CC93A94FD029}" type="datetime1">
+              <a:rPr lang="pt-BR" smtClean="0"/>
+              <a:t>09/04/2012</a:t>
             </a:fld>
             <a:endParaRPr lang="pt-BR"/>
           </a:p>
@@ -3097,12 +3578,9 @@
             <a:pPr>
               <a:defRPr/>
             </a:pPr>
-            <a:fld id="{EC641DEF-9A3E-4004-B8B2-60D220151CD6}" type="datetimeFigureOut">
-              <a:rPr lang="pt-BR"/>
-              <a:pPr>
-                <a:defRPr/>
-              </a:pPr>
-              <a:t>08/04/2012</a:t>
+            <a:fld id="{073A47F4-5E93-420A-99CB-18A2683BB367}" type="datetime1">
+              <a:rPr lang="pt-BR" smtClean="0"/>
+              <a:t>09/04/2012</a:t>
             </a:fld>
             <a:endParaRPr lang="pt-BR"/>
           </a:p>
@@ -3498,12 +3976,9 @@
             <a:pPr>
               <a:defRPr/>
             </a:pPr>
-            <a:fld id="{C8BFF6A4-5A57-47A6-B16D-00194E15FD6F}" type="datetimeFigureOut">
-              <a:rPr lang="pt-BR"/>
-              <a:pPr>
-                <a:defRPr/>
-              </a:pPr>
-              <a:t>08/04/2012</a:t>
+            <a:fld id="{AE8C255C-5DDA-4734-9359-9A6B11999567}" type="datetime1">
+              <a:rPr lang="pt-BR" smtClean="0"/>
+              <a:t>09/04/2012</a:t>
             </a:fld>
             <a:endParaRPr lang="pt-BR"/>
           </a:p>
@@ -3647,12 +4122,9 @@
             <a:pPr>
               <a:defRPr/>
             </a:pPr>
-            <a:fld id="{B04514EF-C93C-4839-AD63-80516E2E1DCD}" type="datetimeFigureOut">
-              <a:rPr lang="pt-BR"/>
-              <a:pPr>
-                <a:defRPr/>
-              </a:pPr>
-              <a:t>08/04/2012</a:t>
+            <a:fld id="{E236D155-7BBB-45C4-ABC4-5825C117F67D}" type="datetime1">
+              <a:rPr lang="pt-BR" smtClean="0"/>
+              <a:t>09/04/2012</a:t>
             </a:fld>
             <a:endParaRPr lang="pt-BR"/>
           </a:p>
@@ -3764,12 +4236,9 @@
             <a:pPr>
               <a:defRPr/>
             </a:pPr>
-            <a:fld id="{5A627376-D811-4262-859A-B9DABC423D4A}" type="datetimeFigureOut">
-              <a:rPr lang="pt-BR"/>
-              <a:pPr>
-                <a:defRPr/>
-              </a:pPr>
-              <a:t>08/04/2012</a:t>
+            <a:fld id="{ADDA66B1-D962-4AF9-8041-2780240F2977}" type="datetime1">
+              <a:rPr lang="pt-BR" smtClean="0"/>
+              <a:t>09/04/2012</a:t>
             </a:fld>
             <a:endParaRPr lang="pt-BR"/>
           </a:p>
@@ -4040,12 +4509,9 @@
             <a:pPr>
               <a:defRPr/>
             </a:pPr>
-            <a:fld id="{0ED9C282-AAF0-405F-B5B3-3F05FAC5EE57}" type="datetimeFigureOut">
-              <a:rPr lang="pt-BR"/>
-              <a:pPr>
-                <a:defRPr/>
-              </a:pPr>
-              <a:t>08/04/2012</a:t>
+            <a:fld id="{4C1A83F6-6FBF-4EB7-90C4-9B7B04521E4C}" type="datetime1">
+              <a:rPr lang="pt-BR" smtClean="0"/>
+              <a:t>09/04/2012</a:t>
             </a:fld>
             <a:endParaRPr lang="pt-BR"/>
           </a:p>
@@ -4324,12 +4790,9 @@
             <a:pPr>
               <a:defRPr/>
             </a:pPr>
-            <a:fld id="{57EB369B-17BF-4EF9-ACD7-3C0250BA6C9F}" type="datetimeFigureOut">
-              <a:rPr lang="pt-BR"/>
-              <a:pPr>
-                <a:defRPr/>
-              </a:pPr>
-              <a:t>08/04/2012</a:t>
+            <a:fld id="{03DF3507-3DD9-4EBB-A5AB-E1BB8B54E2DA}" type="datetime1">
+              <a:rPr lang="pt-BR" smtClean="0"/>
+              <a:t>09/04/2012</a:t>
             </a:fld>
             <a:endParaRPr lang="pt-BR"/>
           </a:p>
@@ -4802,12 +5265,9 @@
             <a:pPr>
               <a:defRPr/>
             </a:pPr>
-            <a:fld id="{6889B05A-2323-406C-BDA3-4FFB2FE5B464}" type="datetimeFigureOut">
-              <a:rPr lang="pt-BR"/>
-              <a:pPr>
-                <a:defRPr/>
-              </a:pPr>
-              <a:t>08/04/2012</a:t>
+            <a:fld id="{4A470D32-1CF6-49A0-A64D-15AF2EDAD15C}" type="datetime1">
+              <a:rPr lang="pt-BR" smtClean="0"/>
+              <a:t>09/04/2012</a:t>
             </a:fld>
             <a:endParaRPr lang="pt-BR"/>
           </a:p>
@@ -4890,7 +5350,7 @@
               <a:spcAft>
                 <a:spcPts val="0"/>
               </a:spcAft>
-              <a:defRPr kumimoji="0" sz="1000">
+              <a:defRPr kumimoji="0" sz="1600">
                 <a:solidFill>
                   <a:schemeClr val="tx2">
                     <a:shade val="50000"/>
@@ -4906,7 +5366,7 @@
               <a:defRPr/>
             </a:pPr>
             <a:fld id="{4C1B88AB-0397-4CEF-BDD1-027394AFB92B}" type="slidenum">
-              <a:rPr lang="pt-BR"/>
+              <a:rPr lang="pt-BR" smtClean="0"/>
               <a:pPr>
                 <a:defRPr/>
               </a:pPr>
@@ -4932,6 +5392,7 @@
     <p:sldLayoutId id="2147483825" r:id="rId10"/>
     <p:sldLayoutId id="2147483826" r:id="rId11"/>
   </p:sldLayoutIdLst>
+  <p:hf hdr="0" ftr="0" dt="0"/>
   <p:txStyles>
     <p:titleStyle>
       <a:lvl1pPr algn="l" rtl="0" eaLnBrk="0" fontAlgn="base" hangingPunct="0">
@@ -5435,6 +5896,595 @@
 </p:sld>
 </file>
 
+<file path=ppt/slides/slide10.xml><?xml version="1.0" encoding="utf-8"?>
+<p:sld xmlns:a="http://schemas.openxmlformats.org/drawingml/2006/main" xmlns:r="http://schemas.openxmlformats.org/officeDocument/2006/relationships" xmlns:p="http://schemas.openxmlformats.org/presentationml/2006/main">
+  <p:cSld>
+    <p:spTree>
+      <p:nvGrpSpPr>
+        <p:cNvPr id="1" name=""/>
+        <p:cNvGrpSpPr/>
+        <p:nvPr/>
+      </p:nvGrpSpPr>
+      <p:grpSpPr>
+        <a:xfrm>
+          <a:off x="0" y="0"/>
+          <a:ext cx="0" cy="0"/>
+          <a:chOff x="0" y="0"/>
+          <a:chExt cx="0" cy="0"/>
+        </a:xfrm>
+      </p:grpSpPr>
+      <p:sp>
+        <p:nvSpPr>
+          <p:cNvPr id="11266" name="Título 1"/>
+          <p:cNvSpPr>
+            <a:spLocks noGrp="1"/>
+          </p:cNvSpPr>
+          <p:nvPr>
+            <p:ph type="title"/>
+          </p:nvPr>
+        </p:nvSpPr>
+        <p:spPr>
+          <a:xfrm>
+            <a:off x="457200" y="274638"/>
+            <a:ext cx="8686800" cy="1143000"/>
+          </a:xfrm>
+        </p:spPr>
+        <p:txBody>
+          <a:bodyPr/>
+          <a:lstStyle/>
+          <a:p>
+            <a:pPr eaLnBrk="1" hangingPunct="1"/>
+            <a:r>
+              <a:rPr lang="pt-BR" spc="-50" dirty="0" smtClean="0"/>
+              <a:t>Ativando e desativando asserções</a:t>
+            </a:r>
+          </a:p>
+        </p:txBody>
+      </p:sp>
+      <p:sp>
+        <p:nvSpPr>
+          <p:cNvPr id="11267" name="Espaço Reservado para Conteúdo 2"/>
+          <p:cNvSpPr>
+            <a:spLocks noGrp="1"/>
+          </p:cNvSpPr>
+          <p:nvPr>
+            <p:ph idx="1"/>
+          </p:nvPr>
+        </p:nvSpPr>
+        <p:spPr>
+          <a:xfrm>
+            <a:off x="457200" y="1600200"/>
+            <a:ext cx="8003232" cy="4525963"/>
+          </a:xfrm>
+        </p:spPr>
+        <p:txBody>
+          <a:bodyPr/>
+          <a:lstStyle/>
+          <a:p>
+            <a:pPr marL="0" indent="0" algn="ctr">
+              <a:spcBef>
+                <a:spcPts val="3000"/>
+              </a:spcBef>
+              <a:buNone/>
+            </a:pPr>
+            <a:endParaRPr lang="pt-BR" sz="2400" dirty="0" smtClean="0"/>
+          </a:p>
+          <a:p>
+            <a:pPr marL="0" indent="0" algn="ctr">
+              <a:spcBef>
+                <a:spcPts val="3000"/>
+              </a:spcBef>
+              <a:buNone/>
+            </a:pPr>
+            <a:endParaRPr lang="pt-BR" sz="2400" dirty="0" smtClean="0"/>
+          </a:p>
+          <a:p>
+            <a:pPr marL="0" indent="0" algn="ctr">
+              <a:spcBef>
+                <a:spcPts val="3000"/>
+              </a:spcBef>
+              <a:buNone/>
+            </a:pPr>
+            <a:r>
+              <a:rPr lang="pt-BR" sz="2400" dirty="0" err="1" smtClean="0"/>
+              <a:t>java</a:t>
+            </a:r>
+            <a:r>
+              <a:rPr lang="pt-BR" sz="2400" dirty="0" smtClean="0"/>
+              <a:t> </a:t>
+            </a:r>
+            <a:r>
+              <a:rPr lang="pt-BR" sz="2400" dirty="0" smtClean="0">
+                <a:solidFill>
+                  <a:srgbClr val="FFC000"/>
+                </a:solidFill>
+              </a:rPr>
+              <a:t>-</a:t>
+            </a:r>
+            <a:r>
+              <a:rPr lang="pt-BR" sz="2400" dirty="0" err="1" smtClean="0">
+                <a:solidFill>
+                  <a:srgbClr val="FFC000"/>
+                </a:solidFill>
+              </a:rPr>
+              <a:t>ea</a:t>
+            </a:r>
+            <a:r>
+              <a:rPr lang="pt-BR" sz="2400" dirty="0" smtClean="0">
+                <a:solidFill>
+                  <a:srgbClr val="FFC000"/>
+                </a:solidFill>
+              </a:rPr>
+              <a:t>:br.com.tabajara...</a:t>
+            </a:r>
+            <a:r>
+              <a:rPr lang="pt-BR" sz="2400" dirty="0" smtClean="0"/>
+              <a:t> br.com.tabajara.Start</a:t>
+            </a:r>
+          </a:p>
+          <a:p>
+            <a:pPr marL="0" indent="0" algn="ctr">
+              <a:spcBef>
+                <a:spcPts val="3000"/>
+              </a:spcBef>
+              <a:buNone/>
+            </a:pPr>
+            <a:endParaRPr lang="pt-BR" sz="2400" dirty="0" smtClean="0"/>
+          </a:p>
+          <a:p>
+            <a:pPr>
+              <a:spcBef>
+                <a:spcPts val="3000"/>
+              </a:spcBef>
+            </a:pPr>
+            <a:r>
+              <a:rPr lang="pt-BR" sz="2400" dirty="0" smtClean="0"/>
+              <a:t>Executa a classe br.com.tabajara.Start realizando a verificação de asserções somente nas classes que pertencem ao pacote </a:t>
+            </a:r>
+            <a:r>
+              <a:rPr lang="pt-BR" sz="2400" dirty="0" smtClean="0">
+                <a:solidFill>
+                  <a:srgbClr val="FFC000"/>
+                </a:solidFill>
+              </a:rPr>
+              <a:t>br.com.tabajara</a:t>
+            </a:r>
+            <a:r>
+              <a:rPr lang="pt-BR" sz="2400" dirty="0" smtClean="0"/>
+              <a:t> ao a algum de seus subpacotes.</a:t>
+            </a:r>
+            <a:endParaRPr lang="pt-BR" sz="2400" dirty="0" smtClean="0"/>
+          </a:p>
+        </p:txBody>
+      </p:sp>
+      <p:sp>
+        <p:nvSpPr>
+          <p:cNvPr id="4" name="Espaço Reservado para Número de Slide 3"/>
+          <p:cNvSpPr>
+            <a:spLocks noGrp="1"/>
+          </p:cNvSpPr>
+          <p:nvPr>
+            <p:ph type="sldNum" sz="quarter" idx="12"/>
+          </p:nvPr>
+        </p:nvSpPr>
+        <p:spPr/>
+        <p:txBody>
+          <a:bodyPr/>
+          <a:lstStyle/>
+          <a:p>
+            <a:pPr>
+              <a:defRPr/>
+            </a:pPr>
+            <a:fld id="{2713EE29-91C6-4A19-BBBC-4CC27F71B778}" type="slidenum">
+              <a:rPr lang="pt-BR" smtClean="0"/>
+              <a:pPr>
+                <a:defRPr/>
+              </a:pPr>
+              <a:t>10</a:t>
+            </a:fld>
+            <a:endParaRPr lang="pt-BR"/>
+          </a:p>
+        </p:txBody>
+      </p:sp>
+    </p:spTree>
+  </p:cSld>
+  <p:clrMapOvr>
+    <a:masterClrMapping/>
+  </p:clrMapOvr>
+  <p:timing>
+    <p:tnLst>
+      <p:par>
+        <p:cTn id="1" dur="indefinite" restart="never" nodeType="tmRoot"/>
+      </p:par>
+    </p:tnLst>
+  </p:timing>
+</p:sld>
+</file>
+
+<file path=ppt/slides/slide11.xml><?xml version="1.0" encoding="utf-8"?>
+<p:sld xmlns:a="http://schemas.openxmlformats.org/drawingml/2006/main" xmlns:r="http://schemas.openxmlformats.org/officeDocument/2006/relationships" xmlns:p="http://schemas.openxmlformats.org/presentationml/2006/main">
+  <p:cSld>
+    <p:spTree>
+      <p:nvGrpSpPr>
+        <p:cNvPr id="1" name=""/>
+        <p:cNvGrpSpPr/>
+        <p:nvPr/>
+      </p:nvGrpSpPr>
+      <p:grpSpPr>
+        <a:xfrm>
+          <a:off x="0" y="0"/>
+          <a:ext cx="0" cy="0"/>
+          <a:chOff x="0" y="0"/>
+          <a:chExt cx="0" cy="0"/>
+        </a:xfrm>
+      </p:grpSpPr>
+      <p:sp>
+        <p:nvSpPr>
+          <p:cNvPr id="11266" name="Título 1"/>
+          <p:cNvSpPr>
+            <a:spLocks noGrp="1"/>
+          </p:cNvSpPr>
+          <p:nvPr>
+            <p:ph type="title"/>
+          </p:nvPr>
+        </p:nvSpPr>
+        <p:spPr>
+          <a:xfrm>
+            <a:off x="457200" y="274638"/>
+            <a:ext cx="8686800" cy="1143000"/>
+          </a:xfrm>
+        </p:spPr>
+        <p:txBody>
+          <a:bodyPr/>
+          <a:lstStyle/>
+          <a:p>
+            <a:pPr eaLnBrk="1" hangingPunct="1"/>
+            <a:r>
+              <a:rPr lang="pt-BR" spc="-50" dirty="0" smtClean="0"/>
+              <a:t>Ativando e desativando asserções</a:t>
+            </a:r>
+          </a:p>
+        </p:txBody>
+      </p:sp>
+      <p:sp>
+        <p:nvSpPr>
+          <p:cNvPr id="11267" name="Espaço Reservado para Conteúdo 2"/>
+          <p:cNvSpPr>
+            <a:spLocks noGrp="1"/>
+          </p:cNvSpPr>
+          <p:nvPr>
+            <p:ph idx="1"/>
+          </p:nvPr>
+        </p:nvSpPr>
+        <p:spPr>
+          <a:xfrm>
+            <a:off x="457200" y="1600200"/>
+            <a:ext cx="8003232" cy="4525963"/>
+          </a:xfrm>
+        </p:spPr>
+        <p:txBody>
+          <a:bodyPr/>
+          <a:lstStyle/>
+          <a:p>
+            <a:pPr marL="2327275" indent="-720725">
+              <a:spcBef>
+                <a:spcPts val="3000"/>
+              </a:spcBef>
+              <a:buNone/>
+            </a:pPr>
+            <a:endParaRPr lang="pt-BR" sz="2400" dirty="0" smtClean="0"/>
+          </a:p>
+          <a:p>
+            <a:pPr marL="2327275" indent="-720725">
+              <a:spcBef>
+                <a:spcPts val="3000"/>
+              </a:spcBef>
+              <a:buNone/>
+            </a:pPr>
+            <a:r>
+              <a:rPr lang="pt-BR" sz="2400" dirty="0" err="1" smtClean="0"/>
+              <a:t>java</a:t>
+            </a:r>
+            <a:r>
+              <a:rPr lang="pt-BR" sz="2400" dirty="0" smtClean="0"/>
+              <a:t>	</a:t>
+            </a:r>
+            <a:r>
+              <a:rPr lang="pt-BR" sz="2400" dirty="0" smtClean="0">
+                <a:solidFill>
+                  <a:srgbClr val="FFC000"/>
+                </a:solidFill>
+              </a:rPr>
+              <a:t>-</a:t>
+            </a:r>
+            <a:r>
+              <a:rPr lang="pt-BR" sz="2400" dirty="0" err="1" smtClean="0">
+                <a:solidFill>
+                  <a:srgbClr val="FFC000"/>
+                </a:solidFill>
+              </a:rPr>
+              <a:t>ea</a:t>
+            </a:r>
+            <a:r>
+              <a:rPr lang="pt-BR" sz="2400" dirty="0" smtClean="0">
+                <a:solidFill>
+                  <a:srgbClr val="FFC000"/>
+                </a:solidFill>
+              </a:rPr>
+              <a:t>:br.com.tabajara...</a:t>
+            </a:r>
+            <a:br>
+              <a:rPr lang="pt-BR" sz="2400" dirty="0" smtClean="0">
+                <a:solidFill>
+                  <a:srgbClr val="FFC000"/>
+                </a:solidFill>
+              </a:rPr>
+            </a:br>
+            <a:r>
+              <a:rPr lang="pt-BR" sz="2400" dirty="0" smtClean="0">
+                <a:solidFill>
+                  <a:srgbClr val="FFC000"/>
+                </a:solidFill>
+              </a:rPr>
+              <a:t>-</a:t>
+            </a:r>
+            <a:r>
+              <a:rPr lang="pt-BR" sz="2400" dirty="0" err="1" smtClean="0">
+                <a:solidFill>
+                  <a:srgbClr val="FFC000"/>
+                </a:solidFill>
+              </a:rPr>
+              <a:t>ea</a:t>
+            </a:r>
+            <a:r>
+              <a:rPr lang="pt-BR" sz="2400" dirty="0" smtClean="0">
+                <a:solidFill>
+                  <a:srgbClr val="FFC000"/>
+                </a:solidFill>
+              </a:rPr>
+              <a:t>:br.com.</a:t>
+            </a:r>
+            <a:r>
+              <a:rPr lang="pt-BR" sz="2400" dirty="0" err="1" smtClean="0">
+                <a:solidFill>
+                  <a:srgbClr val="FFC000"/>
+                </a:solidFill>
+              </a:rPr>
+              <a:t>utils</a:t>
+            </a:r>
+            <a:r>
+              <a:rPr lang="pt-BR" sz="2400" dirty="0" smtClean="0">
+                <a:solidFill>
+                  <a:srgbClr val="FFC000"/>
+                </a:solidFill>
+              </a:rPr>
+              <a:t>...</a:t>
+            </a:r>
+            <a:br>
+              <a:rPr lang="pt-BR" sz="2400" dirty="0" smtClean="0">
+                <a:solidFill>
+                  <a:srgbClr val="FFC000"/>
+                </a:solidFill>
+              </a:rPr>
+            </a:br>
+            <a:r>
+              <a:rPr lang="pt-BR" sz="2400" dirty="0" smtClean="0">
+                <a:solidFill>
+                  <a:srgbClr val="FFC000"/>
+                </a:solidFill>
+              </a:rPr>
+              <a:t>-da:br.com.tabajara.Cliente</a:t>
+            </a:r>
+            <a:br>
+              <a:rPr lang="pt-BR" sz="2400" dirty="0" smtClean="0">
+                <a:solidFill>
+                  <a:srgbClr val="FFC000"/>
+                </a:solidFill>
+              </a:rPr>
+            </a:br>
+            <a:r>
+              <a:rPr lang="pt-BR" sz="2400" dirty="0" smtClean="0"/>
+              <a:t>br.com.tabajara.Start</a:t>
+            </a:r>
+            <a:br>
+              <a:rPr lang="pt-BR" sz="2400" dirty="0" smtClean="0"/>
+            </a:br>
+            <a:endParaRPr lang="pt-BR" sz="2400" dirty="0" smtClean="0"/>
+          </a:p>
+          <a:p>
+            <a:pPr>
+              <a:spcBef>
+                <a:spcPts val="3000"/>
+              </a:spcBef>
+            </a:pPr>
+            <a:r>
+              <a:rPr lang="pt-BR" sz="2400" dirty="0" smtClean="0"/>
+              <a:t>Executa a classe br.com.tabajara.Start realizando a verificação de asserções nas classes dos pacotes e subpacotes de </a:t>
+            </a:r>
+            <a:r>
+              <a:rPr lang="pt-BR" sz="2400" dirty="0" smtClean="0">
+                <a:solidFill>
+                  <a:srgbClr val="FFC000"/>
+                </a:solidFill>
+              </a:rPr>
+              <a:t>br.com.tabajara</a:t>
+            </a:r>
+            <a:r>
+              <a:rPr lang="pt-BR" sz="2400" dirty="0" smtClean="0"/>
+              <a:t> e </a:t>
+            </a:r>
+            <a:r>
+              <a:rPr lang="pt-BR" sz="2400" dirty="0" smtClean="0">
+                <a:solidFill>
+                  <a:srgbClr val="FFC000"/>
+                </a:solidFill>
+              </a:rPr>
+              <a:t>br.com.</a:t>
+            </a:r>
+            <a:r>
+              <a:rPr lang="pt-BR" sz="2400" dirty="0" err="1" smtClean="0">
+                <a:solidFill>
+                  <a:srgbClr val="FFC000"/>
+                </a:solidFill>
+              </a:rPr>
+              <a:t>utils</a:t>
+            </a:r>
+            <a:r>
+              <a:rPr lang="pt-BR" sz="2400" dirty="0" smtClean="0"/>
+              <a:t>, mas não na classe </a:t>
+            </a:r>
+            <a:r>
+              <a:rPr lang="pt-BR" sz="2400" dirty="0" smtClean="0">
+                <a:solidFill>
+                  <a:srgbClr val="FFC000"/>
+                </a:solidFill>
+              </a:rPr>
+              <a:t>br.com.tabajara.Cliente</a:t>
+            </a:r>
+            <a:endParaRPr lang="pt-BR" sz="2400" dirty="0" smtClean="0"/>
+          </a:p>
+        </p:txBody>
+      </p:sp>
+      <p:sp>
+        <p:nvSpPr>
+          <p:cNvPr id="4" name="Espaço Reservado para Número de Slide 3"/>
+          <p:cNvSpPr>
+            <a:spLocks noGrp="1"/>
+          </p:cNvSpPr>
+          <p:nvPr>
+            <p:ph type="sldNum" sz="quarter" idx="12"/>
+          </p:nvPr>
+        </p:nvSpPr>
+        <p:spPr/>
+        <p:txBody>
+          <a:bodyPr/>
+          <a:lstStyle/>
+          <a:p>
+            <a:pPr>
+              <a:defRPr/>
+            </a:pPr>
+            <a:fld id="{2713EE29-91C6-4A19-BBBC-4CC27F71B778}" type="slidenum">
+              <a:rPr lang="pt-BR" smtClean="0"/>
+              <a:pPr>
+                <a:defRPr/>
+              </a:pPr>
+              <a:t>11</a:t>
+            </a:fld>
+            <a:endParaRPr lang="pt-BR"/>
+          </a:p>
+        </p:txBody>
+      </p:sp>
+    </p:spTree>
+  </p:cSld>
+  <p:clrMapOvr>
+    <a:masterClrMapping/>
+  </p:clrMapOvr>
+  <p:timing>
+    <p:tnLst>
+      <p:par>
+        <p:cTn id="1" dur="indefinite" restart="never" nodeType="tmRoot"/>
+      </p:par>
+    </p:tnLst>
+  </p:timing>
+</p:sld>
+</file>
+
+<file path=ppt/slides/slide12.xml><?xml version="1.0" encoding="utf-8"?>
+<p:sld xmlns:a="http://schemas.openxmlformats.org/drawingml/2006/main" xmlns:r="http://schemas.openxmlformats.org/officeDocument/2006/relationships" xmlns:p="http://schemas.openxmlformats.org/presentationml/2006/main">
+  <p:cSld>
+    <p:spTree>
+      <p:nvGrpSpPr>
+        <p:cNvPr id="1" name=""/>
+        <p:cNvGrpSpPr/>
+        <p:nvPr/>
+      </p:nvGrpSpPr>
+      <p:grpSpPr>
+        <a:xfrm>
+          <a:off x="0" y="0"/>
+          <a:ext cx="0" cy="0"/>
+          <a:chOff x="0" y="0"/>
+          <a:chExt cx="0" cy="0"/>
+        </a:xfrm>
+      </p:grpSpPr>
+      <p:sp>
+        <p:nvSpPr>
+          <p:cNvPr id="2" name="Título 1"/>
+          <p:cNvSpPr>
+            <a:spLocks noGrp="1"/>
+          </p:cNvSpPr>
+          <p:nvPr>
+            <p:ph type="title"/>
+          </p:nvPr>
+        </p:nvSpPr>
+        <p:spPr/>
+        <p:txBody>
+          <a:bodyPr/>
+          <a:lstStyle/>
+          <a:p>
+            <a:r>
+              <a:rPr lang="pt-BR" dirty="0" smtClean="0"/>
+              <a:t>Exercício</a:t>
+            </a:r>
+            <a:endParaRPr lang="pt-BR" dirty="0"/>
+          </a:p>
+        </p:txBody>
+      </p:sp>
+      <p:sp>
+        <p:nvSpPr>
+          <p:cNvPr id="3" name="Espaço Reservado para Conteúdo 2"/>
+          <p:cNvSpPr>
+            <a:spLocks noGrp="1"/>
+          </p:cNvSpPr>
+          <p:nvPr>
+            <p:ph idx="1"/>
+          </p:nvPr>
+        </p:nvSpPr>
+        <p:spPr/>
+        <p:txBody>
+          <a:bodyPr/>
+          <a:lstStyle/>
+          <a:p>
+            <a:endParaRPr lang="pt-BR" dirty="0"/>
+          </a:p>
+        </p:txBody>
+      </p:sp>
+      <p:sp>
+        <p:nvSpPr>
+          <p:cNvPr id="4" name="Espaço Reservado para Número de Slide 3"/>
+          <p:cNvSpPr>
+            <a:spLocks noGrp="1"/>
+          </p:cNvSpPr>
+          <p:nvPr>
+            <p:ph type="sldNum" sz="quarter" idx="12"/>
+          </p:nvPr>
+        </p:nvSpPr>
+        <p:spPr/>
+        <p:txBody>
+          <a:bodyPr/>
+          <a:lstStyle/>
+          <a:p>
+            <a:pPr>
+              <a:defRPr/>
+            </a:pPr>
+            <a:fld id="{2713EE29-91C6-4A19-BBBC-4CC27F71B778}" type="slidenum">
+              <a:rPr lang="pt-BR" smtClean="0"/>
+              <a:pPr>
+                <a:defRPr/>
+              </a:pPr>
+              <a:t>12</a:t>
+            </a:fld>
+            <a:endParaRPr lang="pt-BR"/>
+          </a:p>
+        </p:txBody>
+      </p:sp>
+    </p:spTree>
+  </p:cSld>
+  <p:clrMapOvr>
+    <a:masterClrMapping/>
+  </p:clrMapOvr>
+</p:sld>
+</file>
+
 <file path=ppt/slides/slide2.xml><?xml version="1.0" encoding="utf-8"?>
 <p:sld xmlns:a="http://schemas.openxmlformats.org/drawingml/2006/main" xmlns:r="http://schemas.openxmlformats.org/officeDocument/2006/relationships" xmlns:p="http://schemas.openxmlformats.org/presentationml/2006/main">
   <p:cSld>
@@ -5504,25 +6554,49 @@
           <a:p>
             <a:r>
               <a:rPr lang="pt-BR" dirty="0" smtClean="0"/>
-              <a:t>Compilando e executando com asserções</a:t>
-            </a:r>
+              <a:t>Executando sua aplicação</a:t>
+            </a:r>
+            <a:endParaRPr lang="pt-BR" dirty="0" smtClean="0"/>
           </a:p>
           <a:p>
             <a:r>
               <a:rPr lang="pt-BR" dirty="0" smtClean="0"/>
-              <a:t>Ativando e desativando asserções</a:t>
-            </a:r>
-          </a:p>
-          <a:p>
-            <a:r>
-              <a:rPr lang="pt-BR" dirty="0" smtClean="0"/>
-              <a:t>Boas práticas no uso de </a:t>
+              <a:t>Ativando e desativando </a:t>
             </a:r>
             <a:r>
               <a:rPr lang="pt-BR" dirty="0" smtClean="0"/>
               <a:t>asserções</a:t>
             </a:r>
             <a:endParaRPr lang="pt-BR" dirty="0" smtClean="0"/>
+          </a:p>
+        </p:txBody>
+      </p:sp>
+      <p:sp>
+        <p:nvSpPr>
+          <p:cNvPr id="4" name="Espaço Reservado para Número de Slide 3"/>
+          <p:cNvSpPr>
+            <a:spLocks noGrp="1"/>
+          </p:cNvSpPr>
+          <p:nvPr>
+            <p:ph type="sldNum" sz="quarter" idx="12"/>
+          </p:nvPr>
+        </p:nvSpPr>
+        <p:spPr/>
+        <p:txBody>
+          <a:bodyPr/>
+          <a:lstStyle/>
+          <a:p>
+            <a:pPr>
+              <a:defRPr/>
+            </a:pPr>
+            <a:fld id="{2713EE29-91C6-4A19-BBBC-4CC27F71B778}" type="slidenum">
+              <a:rPr lang="pt-BR" smtClean="0"/>
+              <a:pPr>
+                <a:defRPr/>
+              </a:pPr>
+              <a:t>2</a:t>
+            </a:fld>
+            <a:endParaRPr lang="pt-BR"/>
           </a:p>
         </p:txBody>
       </p:sp>
@@ -5571,7 +6645,6 @@
               <a:rPr lang="pt-BR" dirty="0" smtClean="0"/>
               <a:t>Introdução</a:t>
             </a:r>
-            <a:endParaRPr lang="pt-BR" dirty="0" smtClean="0"/>
           </a:p>
         </p:txBody>
       </p:sp>
@@ -5610,7 +6683,35 @@
               <a:rPr lang="pt-BR" sz="2400" dirty="0" smtClean="0"/>
               <a:t>Uma asserção trata-se de uma expressão booleana que o programador acredita ser verdadeira naquele ponto do código e, caso não seja, a aplicação dispara um erro durante sua execução.</a:t>
             </a:r>
-            <a:endParaRPr lang="pt-BR" sz="2400" dirty="0" smtClean="0"/>
+          </a:p>
+        </p:txBody>
+      </p:sp>
+      <p:sp>
+        <p:nvSpPr>
+          <p:cNvPr id="4" name="Espaço Reservado para Número de Slide 3"/>
+          <p:cNvSpPr>
+            <a:spLocks noGrp="1"/>
+          </p:cNvSpPr>
+          <p:nvPr>
+            <p:ph type="sldNum" sz="quarter" idx="12"/>
+          </p:nvPr>
+        </p:nvSpPr>
+        <p:spPr/>
+        <p:txBody>
+          <a:bodyPr/>
+          <a:lstStyle/>
+          <a:p>
+            <a:pPr>
+              <a:defRPr/>
+            </a:pPr>
+            <a:fld id="{2713EE29-91C6-4A19-BBBC-4CC27F71B778}" type="slidenum">
+              <a:rPr lang="pt-BR" smtClean="0"/>
+              <a:pPr>
+                <a:defRPr/>
+              </a:pPr>
+              <a:t>3</a:t>
+            </a:fld>
+            <a:endParaRPr lang="pt-BR"/>
           </a:p>
         </p:txBody>
       </p:sp>
@@ -5648,7 +6749,7 @@
       </p:grpSpPr>
       <p:sp>
         <p:nvSpPr>
-          <p:cNvPr id="9218" name="Título 1"/>
+          <p:cNvPr id="8194" name="Título 1"/>
           <p:cNvSpPr>
             <a:spLocks noGrp="1"/>
           </p:cNvSpPr>
@@ -5664,14 +6765,14 @@
             <a:pPr eaLnBrk="1" hangingPunct="1"/>
             <a:r>
               <a:rPr lang="pt-BR" dirty="0" smtClean="0"/>
-              <a:t>Sintaxe das asserções</a:t>
-            </a:r>
-          </a:p>
-        </p:txBody>
-      </p:sp>
-      <p:sp>
-        <p:nvSpPr>
-          <p:cNvPr id="9219" name="Espaço Reservado para Conteúdo 2"/>
+              <a:t>Introdução</a:t>
+            </a:r>
+          </a:p>
+        </p:txBody>
+      </p:sp>
+      <p:sp>
+        <p:nvSpPr>
+          <p:cNvPr id="8195" name="Espaço Reservado para Conteúdo 2"/>
           <p:cNvSpPr>
             <a:spLocks noGrp="1"/>
           </p:cNvSpPr>
@@ -5679,12 +6780,233 @@
             <p:ph idx="1"/>
           </p:nvPr>
         </p:nvSpPr>
+        <p:spPr>
+          <a:xfrm>
+            <a:off x="457200" y="2281139"/>
+            <a:ext cx="8075240" cy="3164086"/>
+          </a:xfrm>
+        </p:spPr>
+        <p:txBody>
+          <a:bodyPr/>
+          <a:lstStyle/>
+          <a:p>
+            <a:pPr marL="0" indent="0">
+              <a:spcBef>
+                <a:spcPts val="0"/>
+              </a:spcBef>
+              <a:buNone/>
+            </a:pPr>
+            <a:r>
+              <a:rPr lang="pt-BR" sz="2400" dirty="0" smtClean="0"/>
+              <a:t>Cliente cli = </a:t>
+            </a:r>
+            <a:r>
+              <a:rPr lang="pt-BR" sz="2400" dirty="0" err="1" smtClean="0"/>
+              <a:t>cn</a:t>
+            </a:r>
+            <a:r>
+              <a:rPr lang="pt-BR" sz="2400" dirty="0" smtClean="0"/>
+              <a:t>.</a:t>
+            </a:r>
+            <a:r>
+              <a:rPr lang="pt-BR" sz="2400" dirty="0" err="1" smtClean="0"/>
+              <a:t>obterCliente</a:t>
+            </a:r>
+            <a:r>
+              <a:rPr lang="pt-BR" sz="2400" dirty="0" smtClean="0"/>
+              <a:t>();</a:t>
+            </a:r>
+          </a:p>
+          <a:p>
+            <a:pPr marL="0" indent="0">
+              <a:spcBef>
+                <a:spcPts val="0"/>
+              </a:spcBef>
+              <a:buNone/>
+            </a:pPr>
+            <a:r>
+              <a:rPr lang="pt-BR" sz="2400" dirty="0" err="1" smtClean="0">
+                <a:solidFill>
+                  <a:srgbClr val="FFC000"/>
+                </a:solidFill>
+              </a:rPr>
+              <a:t>assert</a:t>
+            </a:r>
+            <a:r>
+              <a:rPr lang="pt-BR" sz="2400" dirty="0" smtClean="0">
+                <a:solidFill>
+                  <a:srgbClr val="FFC000"/>
+                </a:solidFill>
+              </a:rPr>
+              <a:t> cli != </a:t>
+            </a:r>
+            <a:r>
+              <a:rPr lang="pt-BR" sz="2400" dirty="0" err="1" smtClean="0">
+                <a:solidFill>
+                  <a:srgbClr val="FFC000"/>
+                </a:solidFill>
+              </a:rPr>
+              <a:t>null</a:t>
+            </a:r>
+            <a:r>
+              <a:rPr lang="pt-BR" sz="2400" dirty="0" smtClean="0">
+                <a:solidFill>
+                  <a:srgbClr val="FFC000"/>
+                </a:solidFill>
+              </a:rPr>
+              <a:t>;</a:t>
+            </a:r>
+          </a:p>
+          <a:p>
+            <a:pPr marL="0" indent="0">
+              <a:spcBef>
+                <a:spcPts val="0"/>
+              </a:spcBef>
+              <a:buNone/>
+            </a:pPr>
+            <a:endParaRPr lang="pt-BR" sz="2400" dirty="0" smtClean="0"/>
+          </a:p>
+          <a:p>
+            <a:pPr marL="0" indent="0">
+              <a:spcBef>
+                <a:spcPts val="0"/>
+              </a:spcBef>
+              <a:buNone/>
+            </a:pPr>
+            <a:r>
+              <a:rPr lang="pt-BR" sz="2400" dirty="0" smtClean="0"/>
+              <a:t>Conta </a:t>
+            </a:r>
+            <a:r>
+              <a:rPr lang="pt-BR" sz="2400" dirty="0" err="1" smtClean="0"/>
+              <a:t>con</a:t>
+            </a:r>
+            <a:r>
+              <a:rPr lang="pt-BR" sz="2400" dirty="0" smtClean="0"/>
+              <a:t> = </a:t>
+            </a:r>
+            <a:r>
+              <a:rPr lang="pt-BR" sz="2400" dirty="0" err="1" smtClean="0"/>
+              <a:t>new</a:t>
+            </a:r>
+            <a:r>
+              <a:rPr lang="pt-BR" sz="2400" dirty="0" smtClean="0"/>
+              <a:t> Conta();</a:t>
+            </a:r>
+          </a:p>
+          <a:p>
+            <a:pPr marL="0" indent="0">
+              <a:spcBef>
+                <a:spcPts val="0"/>
+              </a:spcBef>
+              <a:buNone/>
+            </a:pPr>
+            <a:r>
+              <a:rPr lang="pt-BR" sz="2400" dirty="0" err="1" smtClean="0"/>
+              <a:t>processarSaldo</a:t>
+            </a:r>
+            <a:r>
+              <a:rPr lang="pt-BR" sz="2400" dirty="0" smtClean="0"/>
+              <a:t>(</a:t>
+            </a:r>
+            <a:r>
+              <a:rPr lang="pt-BR" sz="2400" dirty="0" err="1" smtClean="0"/>
+              <a:t>con</a:t>
+            </a:r>
+            <a:r>
+              <a:rPr lang="pt-BR" sz="2400" dirty="0" smtClean="0"/>
+              <a:t>);</a:t>
+            </a:r>
+          </a:p>
+          <a:p>
+            <a:pPr marL="0" indent="0">
+              <a:spcBef>
+                <a:spcPts val="0"/>
+              </a:spcBef>
+              <a:buNone/>
+            </a:pPr>
+            <a:r>
+              <a:rPr lang="pt-BR" sz="2400" dirty="0" err="1" smtClean="0">
+                <a:solidFill>
+                  <a:srgbClr val="FFC000"/>
+                </a:solidFill>
+              </a:rPr>
+              <a:t>assert</a:t>
+            </a:r>
+            <a:r>
+              <a:rPr lang="pt-BR" sz="2400" dirty="0" smtClean="0">
+                <a:solidFill>
+                  <a:srgbClr val="FFC000"/>
+                </a:solidFill>
+              </a:rPr>
+              <a:t> </a:t>
+            </a:r>
+            <a:r>
+              <a:rPr lang="pt-BR" sz="2400" dirty="0" err="1" smtClean="0">
+                <a:solidFill>
+                  <a:srgbClr val="FFC000"/>
+                </a:solidFill>
+              </a:rPr>
+              <a:t>con</a:t>
+            </a:r>
+            <a:r>
+              <a:rPr lang="pt-BR" sz="2400" dirty="0" smtClean="0">
+                <a:solidFill>
+                  <a:srgbClr val="FFC000"/>
+                </a:solidFill>
+              </a:rPr>
+              <a:t>.</a:t>
+            </a:r>
+            <a:r>
+              <a:rPr lang="pt-BR" sz="2400" dirty="0" err="1" smtClean="0">
+                <a:solidFill>
+                  <a:srgbClr val="FFC000"/>
+                </a:solidFill>
+              </a:rPr>
+              <a:t>getSaldo</a:t>
+            </a:r>
+            <a:r>
+              <a:rPr lang="pt-BR" sz="2400" dirty="0" smtClean="0">
+                <a:solidFill>
+                  <a:srgbClr val="FFC000"/>
+                </a:solidFill>
+              </a:rPr>
+              <a:t>() &gt; 0 : “Saldo não deve ser negativo”;</a:t>
+            </a:r>
+            <a:endParaRPr lang="pt-BR" sz="2400" dirty="0" smtClean="0">
+              <a:solidFill>
+                <a:srgbClr val="FFC000"/>
+              </a:solidFill>
+            </a:endParaRPr>
+          </a:p>
+        </p:txBody>
+      </p:sp>
+      <p:sp>
+        <p:nvSpPr>
+          <p:cNvPr id="4" name="Espaço Reservado para Número de Slide 3"/>
+          <p:cNvSpPr>
+            <a:spLocks noGrp="1"/>
+          </p:cNvSpPr>
+          <p:nvPr>
+            <p:ph type="sldNum" sz="quarter" idx="12"/>
+          </p:nvPr>
+        </p:nvSpPr>
         <p:spPr/>
         <p:txBody>
           <a:bodyPr/>
           <a:lstStyle/>
           <a:p>
-            <a:endParaRPr lang="pt-BR" smtClean="0"/>
+            <a:pPr>
+              <a:defRPr/>
+            </a:pPr>
+            <a:fld id="{2713EE29-91C6-4A19-BBBC-4CC27F71B778}" type="slidenum">
+              <a:rPr lang="pt-BR" smtClean="0"/>
+              <a:pPr>
+                <a:defRPr/>
+              </a:pPr>
+              <a:t>4</a:t>
+            </a:fld>
+            <a:endParaRPr lang="pt-BR"/>
           </a:p>
         </p:txBody>
       </p:sp>
@@ -5722,7 +7044,7 @@
       </p:grpSpPr>
       <p:sp>
         <p:nvSpPr>
-          <p:cNvPr id="10242" name="Título 1"/>
+          <p:cNvPr id="9218" name="Título 1"/>
           <p:cNvSpPr>
             <a:spLocks noGrp="1"/>
           </p:cNvSpPr>
@@ -5738,14 +7060,14 @@
             <a:pPr eaLnBrk="1" hangingPunct="1"/>
             <a:r>
               <a:rPr lang="pt-BR" dirty="0" smtClean="0"/>
-              <a:t>Compilando e executando com asserções</a:t>
-            </a:r>
-          </a:p>
-        </p:txBody>
-      </p:sp>
-      <p:sp>
-        <p:nvSpPr>
-          <p:cNvPr id="10243" name="Espaço Reservado para Conteúdo 2"/>
+              <a:t>Sintaxe das asserções</a:t>
+            </a:r>
+          </a:p>
+        </p:txBody>
+      </p:sp>
+      <p:sp>
+        <p:nvSpPr>
+          <p:cNvPr id="9219" name="Espaço Reservado para Conteúdo 2"/>
           <p:cNvSpPr>
             <a:spLocks noGrp="1"/>
           </p:cNvSpPr>
@@ -5758,7 +7080,118 @@
           <a:bodyPr/>
           <a:lstStyle/>
           <a:p>
-            <a:endParaRPr lang="pt-BR" smtClean="0"/>
+            <a:r>
+              <a:rPr lang="pt-BR" sz="3200" dirty="0" err="1" smtClean="0"/>
+              <a:t>assert</a:t>
+            </a:r>
+            <a:r>
+              <a:rPr lang="pt-BR" sz="3200" dirty="0" smtClean="0"/>
+              <a:t> </a:t>
+            </a:r>
+            <a:r>
+              <a:rPr lang="pt-BR" sz="3200" dirty="0" smtClean="0"/>
+              <a:t>&lt;</a:t>
+            </a:r>
+            <a:r>
+              <a:rPr lang="pt-BR" sz="3200" dirty="0" err="1" smtClean="0"/>
+              <a:t>boolean</a:t>
+            </a:r>
+            <a:r>
+              <a:rPr lang="pt-BR" sz="3200" dirty="0" smtClean="0"/>
+              <a:t>&gt;</a:t>
+            </a:r>
+            <a:endParaRPr lang="pt-BR" sz="3200" dirty="0" smtClean="0"/>
+          </a:p>
+          <a:p>
+            <a:pPr lvl="1">
+              <a:spcBef>
+                <a:spcPts val="1800"/>
+              </a:spcBef>
+            </a:pPr>
+            <a:r>
+              <a:rPr lang="pt-BR" sz="2400" dirty="0" smtClean="0"/>
+              <a:t>Realiza a verificação da expressão especificada.</a:t>
+            </a:r>
+          </a:p>
+          <a:p>
+            <a:pPr lvl="1">
+              <a:spcBef>
+                <a:spcPts val="1800"/>
+              </a:spcBef>
+            </a:pPr>
+            <a:r>
+              <a:rPr lang="pt-BR" sz="2400" dirty="0" smtClean="0"/>
+              <a:t>Caso a expressão seja verdadeira, nada ocorre e o fluxo da aplicação segue normalmente como se esta instrução não existisse.</a:t>
+            </a:r>
+          </a:p>
+          <a:p>
+            <a:pPr lvl="1">
+              <a:spcBef>
+                <a:spcPts val="1800"/>
+              </a:spcBef>
+            </a:pPr>
+            <a:r>
+              <a:rPr lang="pt-BR" sz="2400" dirty="0" smtClean="0"/>
+              <a:t>Caso a expre</a:t>
+            </a:r>
+            <a:r>
+              <a:rPr lang="pt-BR" sz="2400" dirty="0" smtClean="0"/>
+              <a:t>ssão seja falsa, é disparado um </a:t>
+            </a:r>
+            <a:r>
+              <a:rPr lang="pt-BR" sz="2400" b="1" i="1" dirty="0" err="1" smtClean="0"/>
+              <a:t>java</a:t>
+            </a:r>
+            <a:r>
+              <a:rPr lang="pt-BR" sz="2400" b="1" i="1" dirty="0" smtClean="0"/>
+              <a:t>.</a:t>
+            </a:r>
+            <a:r>
+              <a:rPr lang="pt-BR" sz="2400" b="1" i="1" dirty="0" err="1" smtClean="0"/>
+              <a:t>lang</a:t>
+            </a:r>
+            <a:r>
+              <a:rPr lang="pt-BR" sz="2400" b="1" i="1" dirty="0" smtClean="0"/>
+              <a:t>.</a:t>
+            </a:r>
+            <a:r>
+              <a:rPr lang="pt-BR" sz="2400" b="1" i="1" dirty="0" err="1" smtClean="0"/>
+              <a:t>AssertionError</a:t>
+            </a:r>
+            <a:r>
+              <a:rPr lang="pt-BR" sz="2400" dirty="0" smtClean="0"/>
+              <a:t>, sinalizando que a condição não foi atendida.</a:t>
+            </a:r>
+            <a:endParaRPr lang="pt-BR" sz="2400" b="1" i="1" dirty="0" smtClean="0"/>
+          </a:p>
+        </p:txBody>
+      </p:sp>
+      <p:sp>
+        <p:nvSpPr>
+          <p:cNvPr id="4" name="Espaço Reservado para Número de Slide 3"/>
+          <p:cNvSpPr>
+            <a:spLocks noGrp="1"/>
+          </p:cNvSpPr>
+          <p:nvPr>
+            <p:ph type="sldNum" sz="quarter" idx="12"/>
+          </p:nvPr>
+        </p:nvSpPr>
+        <p:spPr/>
+        <p:txBody>
+          <a:bodyPr/>
+          <a:lstStyle/>
+          <a:p>
+            <a:pPr>
+              <a:defRPr/>
+            </a:pPr>
+            <a:fld id="{2713EE29-91C6-4A19-BBBC-4CC27F71B778}" type="slidenum">
+              <a:rPr lang="pt-BR" smtClean="0"/>
+              <a:pPr>
+                <a:defRPr/>
+              </a:pPr>
+              <a:t>5</a:t>
+            </a:fld>
+            <a:endParaRPr lang="pt-BR"/>
           </a:p>
         </p:txBody>
       </p:sp>
@@ -5767,6 +7200,13 @@
   <p:clrMapOvr>
     <a:masterClrMapping/>
   </p:clrMapOvr>
+  <p:timing>
+    <p:tnLst>
+      <p:par>
+        <p:cTn id="1" dur="indefinite" restart="never" nodeType="tmRoot"/>
+      </p:par>
+    </p:tnLst>
+  </p:timing>
 </p:sld>
 </file>
 
@@ -5789,7 +7229,7 @@
       </p:grpSpPr>
       <p:sp>
         <p:nvSpPr>
-          <p:cNvPr id="11266" name="Título 1"/>
+          <p:cNvPr id="9218" name="Título 1"/>
           <p:cNvSpPr>
             <a:spLocks noGrp="1"/>
           </p:cNvSpPr>
@@ -5805,14 +7245,14 @@
             <a:pPr eaLnBrk="1" hangingPunct="1"/>
             <a:r>
               <a:rPr lang="pt-BR" dirty="0" smtClean="0"/>
-              <a:t>Ativando e desativando asserções</a:t>
-            </a:r>
-          </a:p>
-        </p:txBody>
-      </p:sp>
-      <p:sp>
-        <p:nvSpPr>
-          <p:cNvPr id="11267" name="Espaço Reservado para Conteúdo 2"/>
+              <a:t>Sintaxe das asserções</a:t>
+            </a:r>
+          </a:p>
+        </p:txBody>
+      </p:sp>
+      <p:sp>
+        <p:nvSpPr>
+          <p:cNvPr id="9219" name="Espaço Reservado para Conteúdo 2"/>
           <p:cNvSpPr>
             <a:spLocks noGrp="1"/>
           </p:cNvSpPr>
@@ -5825,7 +7265,154 @@
           <a:bodyPr/>
           <a:lstStyle/>
           <a:p>
-            <a:endParaRPr lang="pt-BR" smtClean="0"/>
+            <a:r>
+              <a:rPr lang="pt-BR" sz="3200" dirty="0" err="1" smtClean="0"/>
+              <a:t>assert</a:t>
+            </a:r>
+            <a:r>
+              <a:rPr lang="pt-BR" sz="3200" dirty="0" smtClean="0"/>
+              <a:t> </a:t>
+            </a:r>
+            <a:r>
+              <a:rPr lang="pt-BR" sz="3200" dirty="0" smtClean="0"/>
+              <a:t>&lt;</a:t>
+            </a:r>
+            <a:r>
+              <a:rPr lang="pt-BR" sz="3200" dirty="0" err="1" smtClean="0"/>
+              <a:t>boolean</a:t>
+            </a:r>
+            <a:r>
+              <a:rPr lang="pt-BR" sz="3200" dirty="0" smtClean="0"/>
+              <a:t>&gt; : &lt;</a:t>
+            </a:r>
+            <a:r>
+              <a:rPr lang="pt-BR" sz="3200" dirty="0" err="1" smtClean="0"/>
+              <a:t>value</a:t>
+            </a:r>
+            <a:r>
+              <a:rPr lang="pt-BR" sz="3200" dirty="0" smtClean="0"/>
+              <a:t>&gt;</a:t>
+            </a:r>
+            <a:endParaRPr lang="pt-BR" sz="3200" dirty="0" smtClean="0"/>
+          </a:p>
+          <a:p>
+            <a:pPr lvl="1">
+              <a:spcBef>
+                <a:spcPts val="1800"/>
+              </a:spcBef>
+            </a:pPr>
+            <a:r>
+              <a:rPr lang="pt-BR" sz="2400" dirty="0" smtClean="0"/>
+              <a:t>Realiza a verificação da expressão especificada.</a:t>
+            </a:r>
+          </a:p>
+          <a:p>
+            <a:pPr lvl="1">
+              <a:spcBef>
+                <a:spcPts val="1800"/>
+              </a:spcBef>
+            </a:pPr>
+            <a:r>
+              <a:rPr lang="pt-BR" sz="2400" dirty="0" smtClean="0"/>
+              <a:t>Caso a expressão seja verdadeira, nada ocorre e o fluxo da aplicação segue normalmente como se esta instrução não existisse.</a:t>
+            </a:r>
+          </a:p>
+          <a:p>
+            <a:pPr lvl="1">
+              <a:spcBef>
+                <a:spcPts val="1800"/>
+              </a:spcBef>
+            </a:pPr>
+            <a:r>
+              <a:rPr lang="pt-BR" sz="2400" dirty="0" smtClean="0"/>
+              <a:t>Caso a expre</a:t>
+            </a:r>
+            <a:r>
+              <a:rPr lang="pt-BR" sz="2400" dirty="0" smtClean="0"/>
+              <a:t>ssão seja falsa, é disparado um </a:t>
+            </a:r>
+            <a:r>
+              <a:rPr lang="pt-BR" sz="2400" b="1" i="1" dirty="0" err="1" smtClean="0"/>
+              <a:t>java</a:t>
+            </a:r>
+            <a:r>
+              <a:rPr lang="pt-BR" sz="2400" b="1" i="1" dirty="0" smtClean="0"/>
+              <a:t>.</a:t>
+            </a:r>
+            <a:r>
+              <a:rPr lang="pt-BR" sz="2400" b="1" i="1" dirty="0" err="1" smtClean="0"/>
+              <a:t>lang</a:t>
+            </a:r>
+            <a:r>
+              <a:rPr lang="pt-BR" sz="2400" b="1" i="1" dirty="0" smtClean="0"/>
+              <a:t>.</a:t>
+            </a:r>
+            <a:r>
+              <a:rPr lang="pt-BR" sz="2400" b="1" i="1" dirty="0" err="1" smtClean="0"/>
+              <a:t>AssertionError</a:t>
+            </a:r>
+            <a:r>
+              <a:rPr lang="pt-BR" sz="2400" dirty="0" smtClean="0"/>
+              <a:t> contendo a mensagem de erro definida por </a:t>
+            </a:r>
+            <a:r>
+              <a:rPr lang="pt-BR" sz="2400" dirty="0" smtClean="0">
+                <a:solidFill>
+                  <a:srgbClr val="FFC000"/>
+                </a:solidFill>
+              </a:rPr>
+              <a:t>&lt;</a:t>
+            </a:r>
+            <a:r>
+              <a:rPr lang="pt-BR" sz="2400" dirty="0" err="1" smtClean="0">
+                <a:solidFill>
+                  <a:srgbClr val="FFC000"/>
+                </a:solidFill>
+              </a:rPr>
+              <a:t>value</a:t>
+            </a:r>
+            <a:r>
+              <a:rPr lang="pt-BR" sz="2400" dirty="0" smtClean="0">
+                <a:solidFill>
+                  <a:srgbClr val="FFC000"/>
+                </a:solidFill>
+              </a:rPr>
+              <a:t>&gt;</a:t>
+            </a:r>
+            <a:r>
+              <a:rPr lang="pt-BR" sz="2400" dirty="0" smtClean="0"/>
+              <a:t>.</a:t>
+            </a:r>
+            <a:endParaRPr lang="pt-BR" sz="2400" b="1" i="1" dirty="0" smtClean="0"/>
+          </a:p>
+        </p:txBody>
+      </p:sp>
+      <p:sp>
+        <p:nvSpPr>
+          <p:cNvPr id="4" name="Espaço Reservado para Número de Slide 3"/>
+          <p:cNvSpPr>
+            <a:spLocks noGrp="1"/>
+          </p:cNvSpPr>
+          <p:nvPr>
+            <p:ph type="sldNum" sz="quarter" idx="12"/>
+          </p:nvPr>
+        </p:nvSpPr>
+        <p:spPr/>
+        <p:txBody>
+          <a:bodyPr/>
+          <a:lstStyle/>
+          <a:p>
+            <a:pPr>
+              <a:defRPr/>
+            </a:pPr>
+            <a:fld id="{2713EE29-91C6-4A19-BBBC-4CC27F71B778}" type="slidenum">
+              <a:rPr lang="pt-BR" smtClean="0"/>
+              <a:pPr>
+                <a:defRPr/>
+              </a:pPr>
+              <a:t>6</a:t>
+            </a:fld>
+            <a:endParaRPr lang="pt-BR"/>
           </a:p>
         </p:txBody>
       </p:sp>
@@ -5834,6 +7421,13 @@
   <p:clrMapOvr>
     <a:masterClrMapping/>
   </p:clrMapOvr>
+  <p:timing>
+    <p:tnLst>
+      <p:par>
+        <p:cTn id="1" dur="indefinite" restart="never" nodeType="tmRoot"/>
+      </p:par>
+    </p:tnLst>
+  </p:timing>
 </p:sld>
 </file>
 
@@ -5856,7 +7450,7 @@
       </p:grpSpPr>
       <p:sp>
         <p:nvSpPr>
-          <p:cNvPr id="13314" name="Título 1"/>
+          <p:cNvPr id="10242" name="Título 1"/>
           <p:cNvSpPr>
             <a:spLocks noGrp="1"/>
           </p:cNvSpPr>
@@ -5872,18 +7466,15 @@
             <a:pPr eaLnBrk="1" hangingPunct="1"/>
             <a:r>
               <a:rPr lang="pt-BR" dirty="0" smtClean="0"/>
-              <a:t>Boas práticas no </a:t>
-            </a:r>
-            <a:r>
-              <a:rPr lang="pt-BR" dirty="0" smtClean="0"/>
-              <a:t>uso de asserções</a:t>
-            </a:r>
-          </a:p>
-        </p:txBody>
-      </p:sp>
-      <p:sp>
-        <p:nvSpPr>
-          <p:cNvPr id="13315" name="Espaço Reservado para Conteúdo 2"/>
+              <a:t>Executando sua aplicação</a:t>
+            </a:r>
+            <a:endParaRPr lang="pt-BR" dirty="0" smtClean="0"/>
+          </a:p>
+        </p:txBody>
+      </p:sp>
+      <p:sp>
+        <p:nvSpPr>
+          <p:cNvPr id="10243" name="Espaço Reservado para Conteúdo 2"/>
           <p:cNvSpPr>
             <a:spLocks noGrp="1"/>
           </p:cNvSpPr>
@@ -5896,7 +7487,231 @@
           <a:bodyPr/>
           <a:lstStyle/>
           <a:p>
-            <a:endParaRPr lang="pt-BR" smtClean="0"/>
+            <a:pPr>
+              <a:spcBef>
+                <a:spcPts val="3000"/>
+              </a:spcBef>
+            </a:pPr>
+            <a:r>
+              <a:rPr lang="pt-BR" sz="2400" dirty="0" smtClean="0"/>
+              <a:t>Quando executamos pelo modo normal uma aplicação </a:t>
+            </a:r>
+            <a:r>
+              <a:rPr lang="pt-BR" sz="2400" dirty="0" err="1" smtClean="0"/>
+              <a:t>java</a:t>
+            </a:r>
+            <a:r>
+              <a:rPr lang="pt-BR" sz="2400" dirty="0" smtClean="0"/>
+              <a:t> que possuir asserções, estas são totalmente ignoradas pelo JVM</a:t>
+            </a:r>
+          </a:p>
+          <a:p>
+            <a:pPr>
+              <a:spcBef>
+                <a:spcPts val="3000"/>
+              </a:spcBef>
+            </a:pPr>
+            <a:r>
+              <a:rPr lang="pt-BR" sz="2400" dirty="0" smtClean="0"/>
+              <a:t>Para informar ao JVM que desejamos validar as asserções, é necessário utilizar o argumento</a:t>
+            </a:r>
+            <a:br>
+              <a:rPr lang="pt-BR" sz="2400" dirty="0" smtClean="0"/>
+            </a:br>
+            <a:r>
+              <a:rPr lang="pt-BR" sz="2400" b="1" i="1" dirty="0" smtClean="0"/>
+              <a:t>-</a:t>
+            </a:r>
+            <a:r>
+              <a:rPr lang="pt-BR" sz="2400" b="1" i="1" dirty="0" err="1" smtClean="0"/>
+              <a:t>enableassertions</a:t>
+            </a:r>
+            <a:r>
+              <a:rPr lang="pt-BR" sz="2400" dirty="0" smtClean="0"/>
+              <a:t> ao executar sua aplicação, ou simplesmente </a:t>
+            </a:r>
+            <a:r>
+              <a:rPr lang="pt-BR" sz="2400" b="1" i="1" dirty="0" smtClean="0"/>
+              <a:t>-</a:t>
+            </a:r>
+            <a:r>
+              <a:rPr lang="pt-BR" sz="2400" b="1" i="1" dirty="0" err="1" smtClean="0"/>
+              <a:t>ea</a:t>
+            </a:r>
+            <a:endParaRPr lang="pt-BR" sz="2400" b="1" i="1" dirty="0" smtClean="0"/>
+          </a:p>
+          <a:p>
+            <a:pPr marL="0" indent="0" algn="ctr">
+              <a:spcBef>
+                <a:spcPts val="0"/>
+              </a:spcBef>
+              <a:buNone/>
+            </a:pPr>
+            <a:endParaRPr lang="pt-BR" sz="2400" dirty="0" smtClean="0">
+              <a:solidFill>
+                <a:srgbClr val="FFC000"/>
+              </a:solidFill>
+            </a:endParaRPr>
+          </a:p>
+          <a:p>
+            <a:pPr marL="0" indent="0" algn="ctr">
+              <a:spcBef>
+                <a:spcPts val="0"/>
+              </a:spcBef>
+              <a:buNone/>
+            </a:pPr>
+            <a:r>
+              <a:rPr lang="pt-BR" sz="2400" dirty="0" err="1" smtClean="0">
+                <a:solidFill>
+                  <a:srgbClr val="FFC000"/>
+                </a:solidFill>
+              </a:rPr>
+              <a:t>java</a:t>
+            </a:r>
+            <a:r>
+              <a:rPr lang="pt-BR" sz="2400" dirty="0" smtClean="0">
+                <a:solidFill>
+                  <a:srgbClr val="FFC000"/>
+                </a:solidFill>
+              </a:rPr>
+              <a:t> -</a:t>
+            </a:r>
+            <a:r>
+              <a:rPr lang="pt-BR" sz="2400" dirty="0" err="1" smtClean="0">
+                <a:solidFill>
+                  <a:srgbClr val="FFC000"/>
+                </a:solidFill>
+              </a:rPr>
+              <a:t>enableassertions</a:t>
+            </a:r>
+            <a:r>
+              <a:rPr lang="pt-BR" sz="2400" dirty="0" smtClean="0">
+                <a:solidFill>
+                  <a:srgbClr val="FFC000"/>
+                </a:solidFill>
+              </a:rPr>
+              <a:t> </a:t>
+            </a:r>
+            <a:r>
+              <a:rPr lang="pt-BR" sz="2400" dirty="0" err="1" smtClean="0">
+                <a:solidFill>
+                  <a:srgbClr val="FFC000"/>
+                </a:solidFill>
+              </a:rPr>
+              <a:t>OlaMundo</a:t>
+            </a:r>
+            <a:endParaRPr lang="pt-BR" sz="2400" dirty="0" smtClean="0">
+              <a:solidFill>
+                <a:srgbClr val="FFC000"/>
+              </a:solidFill>
+            </a:endParaRPr>
+          </a:p>
+          <a:p>
+            <a:pPr marL="0" indent="0" algn="ctr">
+              <a:spcBef>
+                <a:spcPts val="0"/>
+              </a:spcBef>
+              <a:buNone/>
+            </a:pPr>
+            <a:r>
+              <a:rPr lang="pt-BR" sz="2400" dirty="0" smtClean="0"/>
+              <a:t>ou</a:t>
+            </a:r>
+          </a:p>
+          <a:p>
+            <a:pPr marL="0" indent="0" algn="ctr">
+              <a:spcBef>
+                <a:spcPts val="0"/>
+              </a:spcBef>
+              <a:buNone/>
+            </a:pPr>
+            <a:r>
+              <a:rPr lang="pt-BR" sz="2400" dirty="0" err="1" smtClean="0">
+                <a:solidFill>
+                  <a:srgbClr val="FFC000"/>
+                </a:solidFill>
+              </a:rPr>
+              <a:t>java</a:t>
+            </a:r>
+            <a:r>
+              <a:rPr lang="pt-BR" sz="2400" dirty="0" smtClean="0">
+                <a:solidFill>
+                  <a:srgbClr val="FFC000"/>
+                </a:solidFill>
+              </a:rPr>
+              <a:t> -</a:t>
+            </a:r>
+            <a:r>
+              <a:rPr lang="pt-BR" sz="2400" dirty="0" err="1" smtClean="0">
+                <a:solidFill>
+                  <a:srgbClr val="FFC000"/>
+                </a:solidFill>
+              </a:rPr>
+              <a:t>ea</a:t>
+            </a:r>
+            <a:r>
+              <a:rPr lang="pt-BR" sz="2400" dirty="0" smtClean="0">
+                <a:solidFill>
+                  <a:srgbClr val="FFC000"/>
+                </a:solidFill>
+              </a:rPr>
+              <a:t> </a:t>
+            </a:r>
+            <a:r>
+              <a:rPr lang="pt-BR" sz="2400" dirty="0" err="1" smtClean="0">
+                <a:solidFill>
+                  <a:srgbClr val="FFC000"/>
+                </a:solidFill>
+              </a:rPr>
+              <a:t>OlaMundo</a:t>
+            </a:r>
+            <a:endParaRPr lang="pt-BR" sz="2400" dirty="0" smtClean="0">
+              <a:solidFill>
+                <a:srgbClr val="FFC000"/>
+              </a:solidFill>
+            </a:endParaRPr>
+          </a:p>
+          <a:p>
+            <a:pPr marL="0" indent="0" algn="ctr">
+              <a:spcBef>
+                <a:spcPts val="0"/>
+              </a:spcBef>
+              <a:buNone/>
+            </a:pPr>
+            <a:endParaRPr lang="pt-BR" sz="2400" dirty="0" smtClean="0">
+              <a:solidFill>
+                <a:srgbClr val="FFC000"/>
+              </a:solidFill>
+            </a:endParaRPr>
+          </a:p>
+        </p:txBody>
+      </p:sp>
+      <p:sp>
+        <p:nvSpPr>
+          <p:cNvPr id="4" name="Espaço Reservado para Número de Slide 3"/>
+          <p:cNvSpPr>
+            <a:spLocks noGrp="1"/>
+          </p:cNvSpPr>
+          <p:nvPr>
+            <p:ph type="sldNum" sz="quarter" idx="12"/>
+          </p:nvPr>
+        </p:nvSpPr>
+        <p:spPr/>
+        <p:txBody>
+          <a:bodyPr/>
+          <a:lstStyle/>
+          <a:p>
+            <a:pPr>
+              <a:defRPr/>
+            </a:pPr>
+            <a:fld id="{2713EE29-91C6-4A19-BBBC-4CC27F71B778}" type="slidenum">
+              <a:rPr lang="pt-BR" smtClean="0"/>
+              <a:pPr>
+                <a:defRPr/>
+              </a:pPr>
+              <a:t>7</a:t>
+            </a:fld>
+            <a:endParaRPr lang="pt-BR"/>
           </a:p>
         </p:txBody>
       </p:sp>
@@ -5905,6 +7720,368 @@
   <p:clrMapOvr>
     <a:masterClrMapping/>
   </p:clrMapOvr>
+</p:sld>
+</file>
+
+<file path=ppt/slides/slide8.xml><?xml version="1.0" encoding="utf-8"?>
+<p:sld xmlns:a="http://schemas.openxmlformats.org/drawingml/2006/main" xmlns:r="http://schemas.openxmlformats.org/officeDocument/2006/relationships" xmlns:p="http://schemas.openxmlformats.org/presentationml/2006/main">
+  <p:cSld>
+    <p:spTree>
+      <p:nvGrpSpPr>
+        <p:cNvPr id="1" name=""/>
+        <p:cNvGrpSpPr/>
+        <p:nvPr/>
+      </p:nvGrpSpPr>
+      <p:grpSpPr>
+        <a:xfrm>
+          <a:off x="0" y="0"/>
+          <a:ext cx="0" cy="0"/>
+          <a:chOff x="0" y="0"/>
+          <a:chExt cx="0" cy="0"/>
+        </a:xfrm>
+      </p:grpSpPr>
+      <p:sp>
+        <p:nvSpPr>
+          <p:cNvPr id="11266" name="Título 1"/>
+          <p:cNvSpPr>
+            <a:spLocks noGrp="1"/>
+          </p:cNvSpPr>
+          <p:nvPr>
+            <p:ph type="title"/>
+          </p:nvPr>
+        </p:nvSpPr>
+        <p:spPr>
+          <a:xfrm>
+            <a:off x="457200" y="274638"/>
+            <a:ext cx="8686800" cy="1143000"/>
+          </a:xfrm>
+        </p:spPr>
+        <p:txBody>
+          <a:bodyPr/>
+          <a:lstStyle/>
+          <a:p>
+            <a:pPr eaLnBrk="1" hangingPunct="1"/>
+            <a:r>
+              <a:rPr lang="pt-BR" spc="-50" dirty="0" smtClean="0"/>
+              <a:t>Ativando e desativando asserções</a:t>
+            </a:r>
+          </a:p>
+        </p:txBody>
+      </p:sp>
+      <p:sp>
+        <p:nvSpPr>
+          <p:cNvPr id="11267" name="Espaço Reservado para Conteúdo 2"/>
+          <p:cNvSpPr>
+            <a:spLocks noGrp="1"/>
+          </p:cNvSpPr>
+          <p:nvPr>
+            <p:ph idx="1"/>
+          </p:nvPr>
+        </p:nvSpPr>
+        <p:spPr>
+          <a:xfrm>
+            <a:off x="457200" y="1600200"/>
+            <a:ext cx="8003232" cy="4525963"/>
+          </a:xfrm>
+        </p:spPr>
+        <p:txBody>
+          <a:bodyPr/>
+          <a:lstStyle/>
+          <a:p>
+            <a:pPr>
+              <a:spcBef>
+                <a:spcPts val="3000"/>
+              </a:spcBef>
+            </a:pPr>
+            <a:r>
+              <a:rPr lang="pt-BR" sz="2400" dirty="0" smtClean="0"/>
+              <a:t>Ao executar sua aplicação, podemos também solicitar a verificação parcial das asserções, considerando apenas uma ou mais classes ou pacotes a serem validados</a:t>
+            </a:r>
+          </a:p>
+          <a:p>
+            <a:pPr>
+              <a:spcBef>
+                <a:spcPts val="3000"/>
+              </a:spcBef>
+            </a:pPr>
+            <a:r>
+              <a:rPr lang="pt-BR" sz="2400" dirty="0" smtClean="0"/>
+              <a:t>Para isto contamos também com a ajuda do argumento </a:t>
+            </a:r>
+            <a:r>
+              <a:rPr lang="pt-BR" sz="2400" b="1" i="1" dirty="0" smtClean="0"/>
+              <a:t>-</a:t>
+            </a:r>
+            <a:r>
+              <a:rPr lang="pt-BR" sz="2400" b="1" i="1" dirty="0" err="1" smtClean="0"/>
+              <a:t>disableassertions</a:t>
+            </a:r>
+            <a:r>
+              <a:rPr lang="pt-BR" sz="2400" dirty="0" smtClean="0"/>
+              <a:t> ou simplesmente </a:t>
+            </a:r>
+            <a:r>
+              <a:rPr lang="pt-BR" sz="2400" b="1" i="1" dirty="0" smtClean="0"/>
+              <a:t>-da</a:t>
+            </a:r>
+            <a:endParaRPr lang="pt-BR" sz="2400" b="1" i="1" dirty="0" smtClean="0"/>
+          </a:p>
+        </p:txBody>
+      </p:sp>
+      <p:sp>
+        <p:nvSpPr>
+          <p:cNvPr id="4" name="Espaço Reservado para Número de Slide 3"/>
+          <p:cNvSpPr>
+            <a:spLocks noGrp="1"/>
+          </p:cNvSpPr>
+          <p:nvPr>
+            <p:ph type="sldNum" sz="quarter" idx="12"/>
+          </p:nvPr>
+        </p:nvSpPr>
+        <p:spPr/>
+        <p:txBody>
+          <a:bodyPr/>
+          <a:lstStyle/>
+          <a:p>
+            <a:pPr>
+              <a:defRPr/>
+            </a:pPr>
+            <a:fld id="{2713EE29-91C6-4A19-BBBC-4CC27F71B778}" type="slidenum">
+              <a:rPr lang="pt-BR" smtClean="0"/>
+              <a:pPr>
+                <a:defRPr/>
+              </a:pPr>
+              <a:t>8</a:t>
+            </a:fld>
+            <a:endParaRPr lang="pt-BR"/>
+          </a:p>
+        </p:txBody>
+      </p:sp>
+    </p:spTree>
+  </p:cSld>
+  <p:clrMapOvr>
+    <a:masterClrMapping/>
+  </p:clrMapOvr>
+  <p:timing>
+    <p:tnLst>
+      <p:par>
+        <p:cTn id="1" dur="indefinite" restart="never" nodeType="tmRoot"/>
+      </p:par>
+    </p:tnLst>
+  </p:timing>
+</p:sld>
+</file>
+
+<file path=ppt/slides/slide9.xml><?xml version="1.0" encoding="utf-8"?>
+<p:sld xmlns:a="http://schemas.openxmlformats.org/drawingml/2006/main" xmlns:r="http://schemas.openxmlformats.org/officeDocument/2006/relationships" xmlns:p="http://schemas.openxmlformats.org/presentationml/2006/main">
+  <p:cSld>
+    <p:spTree>
+      <p:nvGrpSpPr>
+        <p:cNvPr id="1" name=""/>
+        <p:cNvGrpSpPr/>
+        <p:nvPr/>
+      </p:nvGrpSpPr>
+      <p:grpSpPr>
+        <a:xfrm>
+          <a:off x="0" y="0"/>
+          <a:ext cx="0" cy="0"/>
+          <a:chOff x="0" y="0"/>
+          <a:chExt cx="0" cy="0"/>
+        </a:xfrm>
+      </p:grpSpPr>
+      <p:sp>
+        <p:nvSpPr>
+          <p:cNvPr id="11266" name="Título 1"/>
+          <p:cNvSpPr>
+            <a:spLocks noGrp="1"/>
+          </p:cNvSpPr>
+          <p:nvPr>
+            <p:ph type="title"/>
+          </p:nvPr>
+        </p:nvSpPr>
+        <p:spPr>
+          <a:xfrm>
+            <a:off x="457200" y="274638"/>
+            <a:ext cx="8686800" cy="1143000"/>
+          </a:xfrm>
+        </p:spPr>
+        <p:txBody>
+          <a:bodyPr/>
+          <a:lstStyle/>
+          <a:p>
+            <a:pPr eaLnBrk="1" hangingPunct="1"/>
+            <a:r>
+              <a:rPr lang="pt-BR" spc="-50" dirty="0" smtClean="0"/>
+              <a:t>Ativando e desativando asserções</a:t>
+            </a:r>
+          </a:p>
+        </p:txBody>
+      </p:sp>
+      <p:sp>
+        <p:nvSpPr>
+          <p:cNvPr id="11267" name="Espaço Reservado para Conteúdo 2"/>
+          <p:cNvSpPr>
+            <a:spLocks noGrp="1"/>
+          </p:cNvSpPr>
+          <p:nvPr>
+            <p:ph idx="1"/>
+          </p:nvPr>
+        </p:nvSpPr>
+        <p:spPr>
+          <a:xfrm>
+            <a:off x="457200" y="1600200"/>
+            <a:ext cx="8003232" cy="4525963"/>
+          </a:xfrm>
+        </p:spPr>
+        <p:txBody>
+          <a:bodyPr/>
+          <a:lstStyle/>
+          <a:p>
+            <a:pPr marL="0" indent="0" algn="ctr">
+              <a:spcBef>
+                <a:spcPts val="3000"/>
+              </a:spcBef>
+              <a:buNone/>
+            </a:pPr>
+            <a:endParaRPr lang="pt-BR" sz="2400" dirty="0" smtClean="0"/>
+          </a:p>
+          <a:p>
+            <a:pPr marL="0" indent="0" algn="ctr">
+              <a:spcBef>
+                <a:spcPts val="3000"/>
+              </a:spcBef>
+              <a:buNone/>
+            </a:pPr>
+            <a:endParaRPr lang="pt-BR" sz="2400" dirty="0" smtClean="0"/>
+          </a:p>
+          <a:p>
+            <a:pPr marL="0" indent="0" algn="ctr">
+              <a:spcBef>
+                <a:spcPts val="3000"/>
+              </a:spcBef>
+              <a:buNone/>
+            </a:pPr>
+            <a:r>
+              <a:rPr lang="pt-BR" sz="2400" dirty="0" err="1" smtClean="0"/>
+              <a:t>java</a:t>
+            </a:r>
+            <a:r>
+              <a:rPr lang="pt-BR" sz="2400" dirty="0" smtClean="0"/>
+              <a:t> </a:t>
+            </a:r>
+            <a:r>
+              <a:rPr lang="pt-BR" sz="2400" dirty="0" smtClean="0">
+                <a:solidFill>
+                  <a:srgbClr val="FFC000"/>
+                </a:solidFill>
+              </a:rPr>
+              <a:t>-</a:t>
+            </a:r>
+            <a:r>
+              <a:rPr lang="pt-BR" sz="2400" dirty="0" err="1" smtClean="0">
+                <a:solidFill>
+                  <a:srgbClr val="FFC000"/>
+                </a:solidFill>
+              </a:rPr>
+              <a:t>ea</a:t>
+            </a:r>
+            <a:r>
+              <a:rPr lang="pt-BR" sz="2400" dirty="0" smtClean="0">
+                <a:solidFill>
+                  <a:srgbClr val="FFC000"/>
+                </a:solidFill>
+              </a:rPr>
+              <a:t>:br.com.tabajara.Cliente</a:t>
+            </a:r>
+            <a:r>
+              <a:rPr lang="pt-BR" sz="2400" dirty="0" smtClean="0"/>
+              <a:t> br.com.tabajara.Start</a:t>
+            </a:r>
+          </a:p>
+          <a:p>
+            <a:pPr marL="0" indent="0" algn="ctr">
+              <a:spcBef>
+                <a:spcPts val="3000"/>
+              </a:spcBef>
+              <a:buNone/>
+            </a:pPr>
+            <a:endParaRPr lang="pt-BR" sz="2400" dirty="0" smtClean="0"/>
+          </a:p>
+          <a:p>
+            <a:pPr>
+              <a:spcBef>
+                <a:spcPts val="3000"/>
+              </a:spcBef>
+            </a:pPr>
+            <a:r>
+              <a:rPr lang="pt-BR" sz="2400" dirty="0" smtClean="0"/>
+              <a:t>Executa a classe br.com.tabajara.Start (esta deve conter o método </a:t>
+            </a:r>
+            <a:r>
+              <a:rPr lang="pt-BR" sz="2400" dirty="0" err="1" smtClean="0"/>
+              <a:t>main</a:t>
+            </a:r>
+            <a:r>
+              <a:rPr lang="pt-BR" sz="2400" dirty="0" smtClean="0"/>
+              <a:t>) realizando a verificação de asserções somente na classe </a:t>
+            </a:r>
+            <a:r>
+              <a:rPr lang="pt-BR" sz="2400" dirty="0" smtClean="0">
+                <a:solidFill>
+                  <a:srgbClr val="FFC000"/>
+                </a:solidFill>
+              </a:rPr>
+              <a:t>br.com.tabajara.Cliente</a:t>
+            </a:r>
+            <a:r>
+              <a:rPr lang="pt-BR" sz="2400" dirty="0" smtClean="0"/>
+              <a:t> quando esta for chamada.</a:t>
+            </a:r>
+            <a:endParaRPr lang="pt-BR" sz="2400" dirty="0" smtClean="0"/>
+          </a:p>
+        </p:txBody>
+      </p:sp>
+      <p:sp>
+        <p:nvSpPr>
+          <p:cNvPr id="4" name="Espaço Reservado para Número de Slide 3"/>
+          <p:cNvSpPr>
+            <a:spLocks noGrp="1"/>
+          </p:cNvSpPr>
+          <p:nvPr>
+            <p:ph type="sldNum" sz="quarter" idx="12"/>
+          </p:nvPr>
+        </p:nvSpPr>
+        <p:spPr/>
+        <p:txBody>
+          <a:bodyPr/>
+          <a:lstStyle/>
+          <a:p>
+            <a:pPr>
+              <a:defRPr/>
+            </a:pPr>
+            <a:fld id="{2713EE29-91C6-4A19-BBBC-4CC27F71B778}" type="slidenum">
+              <a:rPr lang="pt-BR" smtClean="0"/>
+              <a:pPr>
+                <a:defRPr/>
+              </a:pPr>
+              <a:t>9</a:t>
+            </a:fld>
+            <a:endParaRPr lang="pt-BR"/>
+          </a:p>
+        </p:txBody>
+      </p:sp>
+    </p:spTree>
+  </p:cSld>
+  <p:clrMapOvr>
+    <a:masterClrMapping/>
+  </p:clrMapOvr>
+  <p:timing>
+    <p:tnLst>
+      <p:par>
+        <p:cTn id="1" dur="indefinite" restart="never" nodeType="tmRoot"/>
+      </p:par>
+    </p:tnLst>
+  </p:timing>
 </p:sld>
 </file>
 

</xml_diff>